<commit_message>
ajout de la présentation agile SCRUM dans le fichier de présentation
</commit_message>
<xml_diff>
--- a/Présentation.pptx
+++ b/Présentation.pptx
@@ -36,6 +36,8 @@
     <p:sldId id="274" r:id="rId31"/>
     <p:sldId id="275" r:id="rId32"/>
     <p:sldId id="276" r:id="rId33"/>
+    <p:sldId id="277" r:id="rId34"/>
+    <p:sldId id="278" r:id="rId35"/>
   </p:sldIdLst>
   <p:sldSz cx="9144000" cy="5143500"/>
   <p:notesSz cx="7559675" cy="10691813"/>
@@ -72,7 +74,7 @@
         <p:spPr>
           <a:xfrm>
             <a:off x="311760" y="744480"/>
-            <a:ext cx="8519400" cy="2051640"/>
+            <a:ext cx="8519040" cy="2051280"/>
           </a:xfrm>
           <a:prstGeom prst="rect">
             <a:avLst/>
@@ -155,7 +157,7 @@
         <p:txBody>
           <a:bodyPr/>
           <a:p>
-            <a:fld id="{F6645D6B-8960-4099-A4DC-0ECC36ECE530}" type="slidenum">
+            <a:fld id="{3D85CDF7-B6E8-4B94-8815-01A408B81C47}" type="slidenum">
               <a:t>&lt;#&gt;</a:t>
             </a:fld>
           </a:p>
@@ -197,7 +199,7 @@
         <p:txBody>
           <a:bodyPr/>
           <a:p>
-            <a:fld id="{D2A71F3D-C747-4710-8C5F-AC7007C37617}" type="slidenum">
+            <a:fld id="{B3192EFD-1C4D-4A14-B1F4-548568C3A47F}" type="slidenum">
               <a:t>&lt;#&gt;</a:t>
             </a:fld>
           </a:p>
@@ -239,7 +241,7 @@
         <p:txBody>
           <a:bodyPr/>
           <a:p>
-            <a:fld id="{23CAB264-720D-4748-A808-199A5677AEC5}" type="slidenum">
+            <a:fld id="{4512D01B-2804-413F-B21E-8DE36C36366F}" type="slidenum">
               <a:t>&lt;#&gt;</a:t>
             </a:fld>
           </a:p>
@@ -281,7 +283,7 @@
         <p:txBody>
           <a:bodyPr/>
           <a:p>
-            <a:fld id="{0682A50C-1836-4050-B41C-648E1E9619CF}" type="slidenum">
+            <a:fld id="{F9B0CB80-C649-429D-96CC-F8A092F574C3}" type="slidenum">
               <a:t>&lt;#&gt;</a:t>
             </a:fld>
           </a:p>
@@ -323,7 +325,7 @@
         <p:txBody>
           <a:bodyPr/>
           <a:p>
-            <a:fld id="{F1838F24-78CD-44E7-989B-79025D5CF8A4}" type="slidenum">
+            <a:fld id="{2BB8E05B-0900-4757-9236-234E97729A67}" type="slidenum">
               <a:t>&lt;#&gt;</a:t>
             </a:fld>
           </a:p>
@@ -365,7 +367,7 @@
         <p:txBody>
           <a:bodyPr/>
           <a:p>
-            <a:fld id="{F99AB22E-911A-468E-8325-688F1B67DFF8}" type="slidenum">
+            <a:fld id="{69A585B3-D489-4961-8C5D-BD37B6E2EF7D}" type="slidenum">
               <a:t>&lt;#&gt;</a:t>
             </a:fld>
           </a:p>
@@ -406,7 +408,7 @@
         <p:spPr>
           <a:xfrm>
             <a:off x="311760" y="744480"/>
-            <a:ext cx="8519400" cy="2051640"/>
+            <a:ext cx="8519040" cy="2051280"/>
           </a:xfrm>
           <a:prstGeom prst="rect">
             <a:avLst/>
@@ -492,7 +494,7 @@
         <p:txBody>
           <a:bodyPr/>
           <a:p>
-            <a:fld id="{C1FEBAD6-74EE-4779-B4CB-D7995A2E05FD}" type="slidenum">
+            <a:fld id="{8E50723B-1D73-4C87-9A53-E8698BB36822}" type="slidenum">
               <a:t>&lt;#&gt;</a:t>
             </a:fld>
           </a:p>
@@ -533,7 +535,7 @@
         <p:spPr>
           <a:xfrm>
             <a:off x="311760" y="744480"/>
-            <a:ext cx="8519400" cy="2051640"/>
+            <a:ext cx="8519040" cy="2051280"/>
           </a:xfrm>
           <a:prstGeom prst="rect">
             <a:avLst/>
@@ -663,7 +665,7 @@
         <p:txBody>
           <a:bodyPr/>
           <a:p>
-            <a:fld id="{F925D5E6-06A9-495D-B25C-5384CC41676D}" type="slidenum">
+            <a:fld id="{5759521A-8384-4963-950D-1C1F64CA62B2}" type="slidenum">
               <a:t>&lt;#&gt;</a:t>
             </a:fld>
           </a:p>
@@ -704,7 +706,7 @@
         <p:spPr>
           <a:xfrm>
             <a:off x="311760" y="744480"/>
-            <a:ext cx="8519400" cy="2051640"/>
+            <a:ext cx="8519040" cy="2051280"/>
           </a:xfrm>
           <a:prstGeom prst="rect">
             <a:avLst/>
@@ -746,7 +748,7 @@
         <p:txBody>
           <a:bodyPr/>
           <a:p>
-            <a:fld id="{5714036F-7630-42E3-B652-55E5AC39DDD6}" type="slidenum">
+            <a:fld id="{A3CD17D4-CA5D-4FE1-BEC5-53E5596E1E2C}" type="slidenum">
               <a:t>&lt;#&gt;</a:t>
             </a:fld>
           </a:p>
@@ -788,7 +790,7 @@
         <p:txBody>
           <a:bodyPr/>
           <a:p>
-            <a:fld id="{781E5B37-45D5-4DDA-94F7-C6B2113000FB}" type="slidenum">
+            <a:fld id="{31861CE5-F7DA-4292-A452-A535629CA0AE}" type="slidenum">
               <a:t>&lt;#&gt;</a:t>
             </a:fld>
           </a:p>
@@ -830,7 +832,7 @@
         <p:txBody>
           <a:bodyPr/>
           <a:p>
-            <a:fld id="{E1809155-2011-4457-B50C-A9F925AFD8D9}" type="slidenum">
+            <a:fld id="{C5D27A15-8701-46B9-9A47-68B31DAA9524}" type="slidenum">
               <a:t>&lt;#&gt;</a:t>
             </a:fld>
           </a:p>
@@ -878,7 +880,7 @@
         <p:spPr>
           <a:xfrm>
             <a:off x="311760" y="744480"/>
-            <a:ext cx="8519400" cy="2051640"/>
+            <a:ext cx="8519040" cy="2051280"/>
           </a:xfrm>
           <a:prstGeom prst="rect">
             <a:avLst/>
@@ -929,7 +931,7 @@
         <p:spPr>
           <a:xfrm>
             <a:off x="8472600" y="4663080"/>
-            <a:ext cx="547560" cy="392400"/>
+            <a:ext cx="547200" cy="392040"/>
           </a:xfrm>
           <a:prstGeom prst="rect">
             <a:avLst/>
@@ -972,7 +974,7 @@
                 <a:tab algn="l" pos="0"/>
               </a:tabLst>
             </a:pPr>
-            <a:fld id="{470735E4-C995-4F18-9EAC-1AE6160EF9D7}" type="slidenum">
+            <a:fld id="{2A10175B-526E-473A-AC0F-2A095C1BD5D5}" type="slidenum">
               <a:rPr b="0" lang="fr" sz="1000" strike="noStrike" u="none">
                 <a:solidFill>
                   <a:schemeClr val="dk2"/>
@@ -1274,7 +1276,7 @@
         <p:spPr>
           <a:xfrm>
             <a:off x="4572000" y="0"/>
-            <a:ext cx="4570920" cy="5142600"/>
+            <a:ext cx="4570560" cy="5142240"/>
           </a:xfrm>
           <a:prstGeom prst="rect">
             <a:avLst/>
@@ -1328,7 +1330,7 @@
         <p:spPr>
           <a:xfrm>
             <a:off x="8472600" y="4663080"/>
-            <a:ext cx="547560" cy="392400"/>
+            <a:ext cx="547200" cy="392040"/>
           </a:xfrm>
           <a:prstGeom prst="rect">
             <a:avLst/>
@@ -1371,7 +1373,7 @@
                 <a:tab algn="l" pos="0"/>
               </a:tabLst>
             </a:pPr>
-            <a:fld id="{47EFD7C5-0D46-41F8-818F-C3DB8C95529F}" type="slidenum">
+            <a:fld id="{70B21161-AC39-46E9-A5DA-9387949FD935}" type="slidenum">
               <a:rPr b="0" lang="fr" sz="1000" strike="noStrike" u="none">
                 <a:solidFill>
                   <a:schemeClr val="dk2"/>
@@ -1438,7 +1440,7 @@
         <p:spPr>
           <a:xfrm>
             <a:off x="8472600" y="4663080"/>
-            <a:ext cx="547560" cy="392400"/>
+            <a:ext cx="547200" cy="392040"/>
           </a:xfrm>
           <a:prstGeom prst="rect">
             <a:avLst/>
@@ -1481,7 +1483,7 @@
                 <a:tab algn="l" pos="0"/>
               </a:tabLst>
             </a:pPr>
-            <a:fld id="{14420BF5-1C59-4199-BF44-67E18B53B1E0}" type="slidenum">
+            <a:fld id="{BE2A5CF2-C6C8-49BB-853C-52532B623639}" type="slidenum">
               <a:rPr b="0" lang="fr" sz="1000" strike="noStrike" u="none">
                 <a:solidFill>
                   <a:schemeClr val="dk2"/>
@@ -1548,7 +1550,7 @@
         <p:spPr>
           <a:xfrm>
             <a:off x="8472600" y="4663080"/>
-            <a:ext cx="547560" cy="392400"/>
+            <a:ext cx="547200" cy="392040"/>
           </a:xfrm>
           <a:prstGeom prst="rect">
             <a:avLst/>
@@ -1591,7 +1593,7 @@
                 <a:tab algn="l" pos="0"/>
               </a:tabLst>
             </a:pPr>
-            <a:fld id="{26832F08-C34A-4BF2-AC40-4C8BC83067B5}" type="slidenum">
+            <a:fld id="{EA9381F5-3103-4DC6-8D36-54FE1ACF887E}" type="slidenum">
               <a:rPr b="0" lang="fr" sz="1000" strike="noStrike" u="none">
                 <a:solidFill>
                   <a:schemeClr val="dk2"/>
@@ -1658,7 +1660,7 @@
         <p:spPr>
           <a:xfrm>
             <a:off x="8472600" y="4663080"/>
-            <a:ext cx="547560" cy="392400"/>
+            <a:ext cx="547200" cy="392040"/>
           </a:xfrm>
           <a:prstGeom prst="rect">
             <a:avLst/>
@@ -1701,7 +1703,7 @@
                 <a:tab algn="l" pos="0"/>
               </a:tabLst>
             </a:pPr>
-            <a:fld id="{621B32BF-DC14-49DA-BF9B-FBFBED3BFA68}" type="slidenum">
+            <a:fld id="{1C58B48A-76EB-45F0-B5A0-08FB6483586B}" type="slidenum">
               <a:rPr b="0" lang="fr" sz="1000" strike="noStrike" u="none">
                 <a:solidFill>
                   <a:schemeClr val="dk2"/>
@@ -1768,7 +1770,7 @@
         <p:spPr>
           <a:xfrm>
             <a:off x="8472600" y="4663080"/>
-            <a:ext cx="547560" cy="392400"/>
+            <a:ext cx="547200" cy="392040"/>
           </a:xfrm>
           <a:prstGeom prst="rect">
             <a:avLst/>
@@ -1811,7 +1813,7 @@
                 <a:tab algn="l" pos="0"/>
               </a:tabLst>
             </a:pPr>
-            <a:fld id="{CEFBEE7A-B266-49E6-8D25-258BEB68D7F8}" type="slidenum">
+            <a:fld id="{75D11E0A-B205-4DBE-968D-0C9643DA3DC3}" type="slidenum">
               <a:rPr b="0" lang="fr" sz="1000" strike="noStrike" u="none">
                 <a:solidFill>
                   <a:schemeClr val="dk2"/>
@@ -1878,7 +1880,7 @@
         <p:spPr>
           <a:xfrm>
             <a:off x="311760" y="744480"/>
-            <a:ext cx="8519400" cy="2051640"/>
+            <a:ext cx="8519040" cy="2051280"/>
           </a:xfrm>
           <a:prstGeom prst="rect">
             <a:avLst/>
@@ -2168,7 +2170,7 @@
         <p:spPr>
           <a:xfrm>
             <a:off x="8472600" y="4663080"/>
-            <a:ext cx="547560" cy="392400"/>
+            <a:ext cx="547200" cy="392040"/>
           </a:xfrm>
           <a:prstGeom prst="rect">
             <a:avLst/>
@@ -2211,7 +2213,7 @@
                 <a:tab algn="l" pos="0"/>
               </a:tabLst>
             </a:pPr>
-            <a:fld id="{FA8B0D33-0255-46DD-9F20-17CF76C5D95F}" type="slidenum">
+            <a:fld id="{A00719A5-5AED-43F6-9836-7CD4F4C7AF43}" type="slidenum">
               <a:rPr b="0" lang="fr" sz="1000" strike="noStrike" u="none">
                 <a:solidFill>
                   <a:schemeClr val="dk2"/>
@@ -2278,7 +2280,7 @@
         <p:spPr>
           <a:xfrm>
             <a:off x="311760" y="744480"/>
-            <a:ext cx="8519400" cy="2051640"/>
+            <a:ext cx="8519040" cy="2051280"/>
           </a:xfrm>
           <a:prstGeom prst="rect">
             <a:avLst/>
@@ -2807,7 +2809,7 @@
         <p:spPr>
           <a:xfrm>
             <a:off x="8472600" y="4663080"/>
-            <a:ext cx="547560" cy="392400"/>
+            <a:ext cx="547200" cy="392040"/>
           </a:xfrm>
           <a:prstGeom prst="rect">
             <a:avLst/>
@@ -2850,7 +2852,7 @@
                 <a:tab algn="l" pos="0"/>
               </a:tabLst>
             </a:pPr>
-            <a:fld id="{04D5502F-D3D8-416B-8621-3E4741BC87C5}" type="slidenum">
+            <a:fld id="{9FEAC87B-9739-4BF9-AD6B-1C395A4734BC}" type="slidenum">
               <a:rPr b="0" lang="fr" sz="1000" strike="noStrike" u="none">
                 <a:solidFill>
                   <a:schemeClr val="dk2"/>
@@ -2917,7 +2919,7 @@
         <p:spPr>
           <a:xfrm>
             <a:off x="311760" y="744480"/>
-            <a:ext cx="8519400" cy="2051640"/>
+            <a:ext cx="8519040" cy="2051280"/>
           </a:xfrm>
           <a:prstGeom prst="rect">
             <a:avLst/>
@@ -2968,7 +2970,7 @@
         <p:spPr>
           <a:xfrm>
             <a:off x="8472600" y="4663080"/>
-            <a:ext cx="547560" cy="392400"/>
+            <a:ext cx="547200" cy="392040"/>
           </a:xfrm>
           <a:prstGeom prst="rect">
             <a:avLst/>
@@ -3011,7 +3013,7 @@
                 <a:tab algn="l" pos="0"/>
               </a:tabLst>
             </a:pPr>
-            <a:fld id="{365A32DC-1BA4-4B02-93D7-E4826AEDF0BE}" type="slidenum">
+            <a:fld id="{C1C9CF31-2828-4848-889C-D10BE80D4E2D}" type="slidenum">
               <a:rPr b="0" lang="fr" sz="1000" strike="noStrike" u="none">
                 <a:solidFill>
                   <a:schemeClr val="dk2"/>
@@ -3078,7 +3080,7 @@
         <p:spPr>
           <a:xfrm>
             <a:off x="8472600" y="4663080"/>
-            <a:ext cx="547560" cy="392400"/>
+            <a:ext cx="547200" cy="392040"/>
           </a:xfrm>
           <a:prstGeom prst="rect">
             <a:avLst/>
@@ -3121,7 +3123,7 @@
                 <a:tab algn="l" pos="0"/>
               </a:tabLst>
             </a:pPr>
-            <a:fld id="{9436CF47-EAB7-405B-96FA-AA1646379BD9}" type="slidenum">
+            <a:fld id="{5ACD6C4F-794F-491D-8ED7-9F7BFB1468C7}" type="slidenum">
               <a:rPr b="0" lang="fr" sz="1000" strike="noStrike" u="none">
                 <a:solidFill>
                   <a:schemeClr val="dk2"/>
@@ -3188,7 +3190,7 @@
         <p:spPr>
           <a:xfrm>
             <a:off x="8472600" y="4663080"/>
-            <a:ext cx="547560" cy="392400"/>
+            <a:ext cx="547200" cy="392040"/>
           </a:xfrm>
           <a:prstGeom prst="rect">
             <a:avLst/>
@@ -3231,7 +3233,7 @@
                 <a:tab algn="l" pos="0"/>
               </a:tabLst>
             </a:pPr>
-            <a:fld id="{3119260F-A785-4106-B08A-8EDEE9513121}" type="slidenum">
+            <a:fld id="{646AEA9D-2FA2-4B7E-B9B4-7C1418B05DF1}" type="slidenum">
               <a:rPr b="0" lang="fr" sz="1000" strike="noStrike" u="none">
                 <a:solidFill>
                   <a:schemeClr val="dk2"/>
@@ -3294,7 +3296,7 @@
         <p:spPr>
           <a:xfrm>
             <a:off x="2392920" y="1537560"/>
-            <a:ext cx="4221000" cy="801000"/>
+            <a:ext cx="4220640" cy="800640"/>
           </a:xfrm>
           <a:prstGeom prst="rect">
             <a:avLst/>
@@ -3370,7 +3372,7 @@
         <p:spPr>
           <a:xfrm>
             <a:off x="115200" y="118440"/>
-            <a:ext cx="2383560" cy="279000"/>
+            <a:ext cx="2383200" cy="278640"/>
           </a:xfrm>
           <a:prstGeom prst="rect">
             <a:avLst/>
@@ -3461,7 +3463,7 @@
         <p:spPr>
           <a:xfrm>
             <a:off x="8469720" y="0"/>
-            <a:ext cx="673200" cy="339480"/>
+            <a:ext cx="672840" cy="339120"/>
           </a:xfrm>
           <a:prstGeom prst="rect">
             <a:avLst/>
@@ -3514,7 +3516,7 @@
         <p:spPr>
           <a:xfrm>
             <a:off x="311760" y="356040"/>
-            <a:ext cx="8519400" cy="749520"/>
+            <a:ext cx="8519040" cy="749160"/>
           </a:xfrm>
           <a:prstGeom prst="rect">
             <a:avLst/>
@@ -3575,7 +3577,7 @@
         <p:spPr>
           <a:xfrm>
             <a:off x="180000" y="1443960"/>
-            <a:ext cx="8519400" cy="3415320"/>
+            <a:ext cx="8519040" cy="3414960"/>
           </a:xfrm>
           <a:prstGeom prst="rect">
             <a:avLst/>
@@ -3635,7 +3637,7 @@
         <p:spPr>
           <a:xfrm>
             <a:off x="36360" y="1964880"/>
-            <a:ext cx="9142920" cy="3178080"/>
+            <a:ext cx="9142560" cy="3177720"/>
           </a:xfrm>
           <a:prstGeom prst="rect">
             <a:avLst/>
@@ -3688,7 +3690,7 @@
         <p:spPr>
           <a:xfrm>
             <a:off x="311760" y="356040"/>
-            <a:ext cx="8519400" cy="749520"/>
+            <a:ext cx="8519040" cy="749160"/>
           </a:xfrm>
           <a:prstGeom prst="rect">
             <a:avLst/>
@@ -3749,7 +3751,7 @@
         <p:spPr>
           <a:xfrm>
             <a:off x="720000" y="1080000"/>
-            <a:ext cx="8519400" cy="3415320"/>
+            <a:ext cx="8519040" cy="3414960"/>
           </a:xfrm>
           <a:prstGeom prst="rect">
             <a:avLst/>
@@ -3809,7 +3811,7 @@
         <p:spPr>
           <a:xfrm>
             <a:off x="2160000" y="1494360"/>
-            <a:ext cx="5136120" cy="3648600"/>
+            <a:ext cx="5135760" cy="3648240"/>
           </a:xfrm>
           <a:prstGeom prst="rect">
             <a:avLst/>
@@ -3862,7 +3864,7 @@
         <p:spPr>
           <a:xfrm>
             <a:off x="311760" y="444960"/>
-            <a:ext cx="8519400" cy="571680"/>
+            <a:ext cx="8519040" cy="571320"/>
           </a:xfrm>
           <a:prstGeom prst="rect">
             <a:avLst/>
@@ -3923,7 +3925,7 @@
         <p:spPr>
           <a:xfrm>
             <a:off x="311760" y="1152360"/>
-            <a:ext cx="8519400" cy="3415320"/>
+            <a:ext cx="8519040" cy="3414960"/>
           </a:xfrm>
           <a:prstGeom prst="rect">
             <a:avLst/>
@@ -4115,7 +4117,7 @@
         <p:spPr>
           <a:xfrm>
             <a:off x="-4680" y="0"/>
-            <a:ext cx="9152640" cy="238680"/>
+            <a:ext cx="9152280" cy="238320"/>
           </a:xfrm>
           <a:prstGeom prst="rect">
             <a:avLst/>
@@ -4172,7 +4174,7 @@
         <p:spPr>
           <a:xfrm>
             <a:off x="8469720" y="0"/>
-            <a:ext cx="673200" cy="339480"/>
+            <a:ext cx="672840" cy="339120"/>
           </a:xfrm>
           <a:prstGeom prst="rect">
             <a:avLst/>
@@ -4212,407 +4214,9 @@
           <a:chExt cx="0" cy="0"/>
         </a:xfrm>
       </p:grpSpPr>
-      <p:sp>
-        <p:nvSpPr>
-          <p:cNvPr id="69" name="PlaceHolder 1"/>
-          <p:cNvSpPr>
-            <a:spLocks noGrp="1"/>
-          </p:cNvSpPr>
-          <p:nvPr>
-            <p:ph type="title"/>
-          </p:nvPr>
-        </p:nvSpPr>
-        <p:spPr>
-          <a:xfrm>
-            <a:off x="311760" y="444960"/>
-            <a:ext cx="8519400" cy="571680"/>
-          </a:xfrm>
-          <a:prstGeom prst="rect">
-            <a:avLst/>
-          </a:prstGeom>
-          <a:noFill/>
-          <a:ln w="0">
-            <a:noFill/>
-          </a:ln>
-        </p:spPr>
-        <p:txBody>
-          <a:bodyPr lIns="91440" rIns="91440" tIns="91440" bIns="91440" anchor="t">
-            <a:normAutofit/>
-          </a:bodyPr>
-          <a:p>
-            <a:pPr indent="0">
-              <a:lnSpc>
-                <a:spcPct val="115000"/>
-              </a:lnSpc>
-              <a:spcAft>
-                <a:spcPts val="1199"/>
-              </a:spcAft>
-              <a:buNone/>
-              <a:tabLst>
-                <a:tab algn="l" pos="0"/>
-              </a:tabLst>
-            </a:pPr>
-            <a:r>
-              <a:rPr b="0" lang="fr" sz="2000" strike="noStrike" u="none">
-                <a:solidFill>
-                  <a:schemeClr val="dk1"/>
-                </a:solidFill>
-                <a:uFillTx/>
-                <a:latin typeface="Montserrat"/>
-                <a:ea typeface="Montserrat"/>
-              </a:rPr>
-              <a:t>Suivi du projet avec le Kanban</a:t>
-            </a:r>
-            <a:endParaRPr b="0" lang="fr-FR" sz="2000" strike="noStrike" u="none">
-              <a:solidFill>
-                <a:srgbClr val="000000"/>
-              </a:solidFill>
-              <a:uFillTx/>
-              <a:latin typeface="Arial"/>
-            </a:endParaRPr>
-          </a:p>
-        </p:txBody>
-      </p:sp>
-      <p:sp>
-        <p:nvSpPr>
-          <p:cNvPr id="70" name="PlaceHolder 2"/>
-          <p:cNvSpPr>
-            <a:spLocks noGrp="1"/>
-          </p:cNvSpPr>
-          <p:nvPr>
-            <p:ph/>
-          </p:nvPr>
-        </p:nvSpPr>
-        <p:spPr>
-          <a:xfrm>
-            <a:off x="311760" y="1152360"/>
-            <a:ext cx="8519400" cy="3415320"/>
-          </a:xfrm>
-          <a:prstGeom prst="rect">
-            <a:avLst/>
-          </a:prstGeom>
-          <a:noFill/>
-          <a:ln w="0">
-            <a:noFill/>
-          </a:ln>
-        </p:spPr>
-        <p:txBody>
-          <a:bodyPr lIns="91440" rIns="91440" tIns="91440" bIns="91440" anchor="t">
-            <a:normAutofit/>
-          </a:bodyPr>
-          <a:p>
-            <a:pPr indent="0">
-              <a:lnSpc>
-                <a:spcPct val="115000"/>
-              </a:lnSpc>
-              <a:buNone/>
-              <a:tabLst>
-                <a:tab algn="l" pos="0"/>
-              </a:tabLst>
-            </a:pPr>
-            <a:endParaRPr b="0" lang="fr-FR" sz="1800" strike="noStrike" u="none">
-              <a:solidFill>
-                <a:srgbClr val="000000"/>
-              </a:solidFill>
-              <a:uFillTx/>
-              <a:latin typeface="Arial"/>
-            </a:endParaRPr>
-          </a:p>
-          <a:p>
-            <a:pPr indent="0">
-              <a:lnSpc>
-                <a:spcPct val="115000"/>
-              </a:lnSpc>
-              <a:spcBef>
-                <a:spcPts val="1199"/>
-              </a:spcBef>
-              <a:buNone/>
-              <a:tabLst>
-                <a:tab algn="l" pos="0"/>
-              </a:tabLst>
-            </a:pPr>
-            <a:endParaRPr b="0" lang="fr-FR" sz="1800" strike="noStrike" u="none">
-              <a:solidFill>
-                <a:srgbClr val="000000"/>
-              </a:solidFill>
-              <a:uFillTx/>
-              <a:latin typeface="Arial"/>
-            </a:endParaRPr>
-          </a:p>
-          <a:p>
-            <a:pPr marL="457200" indent="0">
-              <a:lnSpc>
-                <a:spcPct val="115000"/>
-              </a:lnSpc>
-              <a:spcBef>
-                <a:spcPts val="1199"/>
-              </a:spcBef>
-              <a:spcAft>
-                <a:spcPts val="1199"/>
-              </a:spcAft>
-              <a:buNone/>
-              <a:tabLst>
-                <a:tab algn="l" pos="0"/>
-              </a:tabLst>
-            </a:pPr>
-            <a:endParaRPr b="0" lang="fr-FR" sz="1800" strike="noStrike" u="none">
-              <a:solidFill>
-                <a:srgbClr val="000000"/>
-              </a:solidFill>
-              <a:uFillTx/>
-              <a:latin typeface="Arial"/>
-            </a:endParaRPr>
-          </a:p>
-        </p:txBody>
-      </p:sp>
-      <p:sp>
-        <p:nvSpPr>
-          <p:cNvPr id="71" name="Google Shape;94;p18"/>
-          <p:cNvSpPr/>
-          <p:nvPr/>
-        </p:nvSpPr>
-        <p:spPr>
-          <a:xfrm>
-            <a:off x="434880" y="1085400"/>
-            <a:ext cx="8319600" cy="1801800"/>
-          </a:xfrm>
-          <a:prstGeom prst="rect">
-            <a:avLst/>
-          </a:prstGeom>
-          <a:noFill/>
-          <a:ln w="0">
-            <a:noFill/>
-          </a:ln>
-        </p:spPr>
-        <p:style>
-          <a:lnRef idx="0"/>
-          <a:fillRef idx="0"/>
-          <a:effectRef idx="0"/>
-          <a:fontRef idx="minor"/>
-        </p:style>
-        <p:txBody>
-          <a:bodyPr lIns="90000" rIns="90000" tIns="91440" bIns="91440" anchor="t">
-            <a:spAutoFit/>
-          </a:bodyPr>
-          <a:p>
-            <a:pPr marL="457200" indent="-324000">
-              <a:lnSpc>
-                <a:spcPct val="150000"/>
-              </a:lnSpc>
-              <a:buClr>
-                <a:srgbClr val="0d0d0d"/>
-              </a:buClr>
-              <a:buFont typeface="Montserrat"/>
-              <a:buChar char="●"/>
-            </a:pPr>
-            <a:r>
-              <a:rPr b="0" lang="fr" sz="1500" strike="noStrike" u="none">
-                <a:solidFill>
-                  <a:srgbClr val="0d0d0d"/>
-                </a:solidFill>
-                <a:highlight>
-                  <a:srgbClr val="ffffff"/>
-                </a:highlight>
-                <a:uFillTx/>
-                <a:latin typeface="Montserrat"/>
-                <a:ea typeface="Montserrat"/>
-              </a:rPr>
-              <a:t>Capture(s) d'écran du tableau Kanban.</a:t>
-            </a:r>
-            <a:endParaRPr b="0" lang="fr-FR" sz="1500" strike="noStrike" u="none">
-              <a:solidFill>
-                <a:srgbClr val="000000"/>
-              </a:solidFill>
-              <a:uFillTx/>
-              <a:latin typeface="Arial"/>
-            </a:endParaRPr>
-          </a:p>
-          <a:p>
-            <a:pPr marL="457200" indent="-324000">
-              <a:lnSpc>
-                <a:spcPct val="150000"/>
-              </a:lnSpc>
-              <a:buClr>
-                <a:srgbClr val="0d0d0d"/>
-              </a:buClr>
-              <a:buFont typeface="Montserrat"/>
-              <a:buChar char="●"/>
-            </a:pPr>
-            <a:r>
-              <a:rPr b="0" lang="fr" sz="1500" strike="noStrike" u="none">
-                <a:solidFill>
-                  <a:srgbClr val="0d0d0d"/>
-                </a:solidFill>
-                <a:highlight>
-                  <a:srgbClr val="ffffff"/>
-                </a:highlight>
-                <a:uFillTx/>
-                <a:latin typeface="Montserrat"/>
-                <a:ea typeface="Montserrat"/>
-              </a:rPr>
-              <a:t>Explication des User Stories (US), tâches attribuées, etc.</a:t>
-            </a:r>
-            <a:endParaRPr b="0" lang="fr-FR" sz="1500" strike="noStrike" u="none">
-              <a:solidFill>
-                <a:srgbClr val="000000"/>
-              </a:solidFill>
-              <a:uFillTx/>
-              <a:latin typeface="Arial"/>
-            </a:endParaRPr>
-          </a:p>
-          <a:p>
-            <a:pPr marL="457200" indent="-324000">
-              <a:lnSpc>
-                <a:spcPct val="150000"/>
-              </a:lnSpc>
-              <a:buClr>
-                <a:srgbClr val="0d0d0d"/>
-              </a:buClr>
-              <a:buFont typeface="Montserrat"/>
-              <a:buChar char="●"/>
-            </a:pPr>
-            <a:r>
-              <a:rPr b="0" lang="fr" sz="1500" strike="noStrike" u="none">
-                <a:solidFill>
-                  <a:srgbClr val="0d0d0d"/>
-                </a:solidFill>
-                <a:highlight>
-                  <a:srgbClr val="ffffff"/>
-                </a:highlight>
-                <a:uFillTx/>
-                <a:latin typeface="Montserrat"/>
-                <a:ea typeface="Montserrat"/>
-              </a:rPr>
-              <a:t>Explication de comment le tableau facilite le suivi et la coordination de l'équipe.</a:t>
-            </a:r>
-            <a:endParaRPr b="0" lang="fr-FR" sz="1500" strike="noStrike" u="none">
-              <a:solidFill>
-                <a:srgbClr val="000000"/>
-              </a:solidFill>
-              <a:uFillTx/>
-              <a:latin typeface="Arial"/>
-            </a:endParaRPr>
-          </a:p>
-          <a:p>
-            <a:pPr>
-              <a:lnSpc>
-                <a:spcPct val="115000"/>
-              </a:lnSpc>
-              <a:tabLst>
-                <a:tab algn="l" pos="0"/>
-              </a:tabLst>
-            </a:pPr>
-            <a:endParaRPr b="0" lang="fr-FR" sz="1200" strike="noStrike" u="none">
-              <a:solidFill>
-                <a:srgbClr val="000000"/>
-              </a:solidFill>
-              <a:uFillTx/>
-              <a:latin typeface="Arial"/>
-            </a:endParaRPr>
-          </a:p>
-          <a:p>
-            <a:pPr>
-              <a:lnSpc>
-                <a:spcPct val="100000"/>
-              </a:lnSpc>
-              <a:spcBef>
-                <a:spcPts val="1199"/>
-              </a:spcBef>
-              <a:tabLst>
-                <a:tab algn="l" pos="0"/>
-              </a:tabLst>
-            </a:pPr>
-            <a:r>
-              <a:rPr b="0" lang="fr" sz="1400" strike="noStrike" u="none">
-                <a:solidFill>
-                  <a:srgbClr val="000000"/>
-                </a:solidFill>
-                <a:uFillTx/>
-                <a:latin typeface="Montserrat"/>
-                <a:ea typeface="Montserrat"/>
-              </a:rPr>
-              <a:t>Ne pas oublier </a:t>
-            </a:r>
-            <a:r>
-              <a:rPr b="0" lang="fr" sz="1500" strike="noStrike" u="none">
-                <a:solidFill>
-                  <a:srgbClr val="0d0d0d"/>
-                </a:solidFill>
-                <a:highlight>
-                  <a:srgbClr val="ffffff"/>
-                </a:highlight>
-                <a:uFillTx/>
-                <a:latin typeface="Montserrat"/>
-                <a:ea typeface="Montserrat"/>
-              </a:rPr>
-              <a:t>la mise en public du lien du tableau</a:t>
-            </a:r>
-            <a:endParaRPr b="0" lang="fr-FR" sz="1500" strike="noStrike" u="none">
-              <a:solidFill>
-                <a:srgbClr val="000000"/>
-              </a:solidFill>
-              <a:uFillTx/>
-              <a:latin typeface="Arial"/>
-            </a:endParaRPr>
-          </a:p>
-        </p:txBody>
-      </p:sp>
-      <p:sp>
-        <p:nvSpPr>
-          <p:cNvPr id="72" name="Google Shape;95;p18"/>
-          <p:cNvSpPr/>
-          <p:nvPr/>
-        </p:nvSpPr>
-        <p:spPr>
-          <a:xfrm>
-            <a:off x="-4680" y="0"/>
-            <a:ext cx="9152640" cy="238680"/>
-          </a:xfrm>
-          <a:prstGeom prst="rect">
-            <a:avLst/>
-          </a:prstGeom>
-          <a:solidFill>
-            <a:srgbClr val="fce5cd"/>
-          </a:solidFill>
-          <a:ln w="9525">
-            <a:solidFill>
-              <a:srgbClr val="f7edde"/>
-            </a:solidFill>
-            <a:round/>
-          </a:ln>
-        </p:spPr>
-        <p:style>
-          <a:lnRef idx="0"/>
-          <a:fillRef idx="0"/>
-          <a:effectRef idx="0"/>
-          <a:fontRef idx="minor"/>
-        </p:style>
-        <p:txBody>
-          <a:bodyPr lIns="90000" rIns="90000" tIns="91440" bIns="91440" anchor="ctr">
-            <a:noAutofit/>
-          </a:bodyPr>
-          <a:p>
-            <a:pPr algn="ctr">
-              <a:lnSpc>
-                <a:spcPct val="100000"/>
-              </a:lnSpc>
-              <a:tabLst>
-                <a:tab algn="l" pos="0"/>
-              </a:tabLst>
-            </a:pPr>
-            <a:endParaRPr b="0" lang="fr-FR" sz="1400" strike="noStrike" u="none">
-              <a:solidFill>
-                <a:srgbClr val="000000"/>
-              </a:solidFill>
-              <a:uFillTx/>
-              <a:latin typeface="Arial"/>
-            </a:endParaRPr>
-          </a:p>
-        </p:txBody>
-      </p:sp>
       <p:pic>
         <p:nvPicPr>
-          <p:cNvPr id="73" name="Google Shape;96;p18" descr=""/>
+          <p:cNvPr id="69" name="" descr=""/>
           <p:cNvPicPr/>
           <p:nvPr/>
         </p:nvPicPr>
@@ -4622,8 +4226,8 @@
         </p:blipFill>
         <p:spPr>
           <a:xfrm>
-            <a:off x="8469720" y="0"/>
-            <a:ext cx="673200" cy="339480"/>
+            <a:off x="19800" y="151200"/>
+            <a:ext cx="9143640" cy="4857840"/>
           </a:xfrm>
           <a:prstGeom prst="rect">
             <a:avLst/>
@@ -4663,66 +4267,9 @@
           <a:chExt cx="0" cy="0"/>
         </a:xfrm>
       </p:grpSpPr>
-      <p:sp>
-        <p:nvSpPr>
-          <p:cNvPr id="74" name="PlaceHolder 1"/>
-          <p:cNvSpPr>
-            <a:spLocks noGrp="1"/>
-          </p:cNvSpPr>
-          <p:nvPr>
-            <p:ph type="title"/>
-          </p:nvPr>
-        </p:nvSpPr>
-        <p:spPr>
-          <a:xfrm>
-            <a:off x="180000" y="180000"/>
-            <a:ext cx="8519400" cy="571680"/>
-          </a:xfrm>
-          <a:prstGeom prst="rect">
-            <a:avLst/>
-          </a:prstGeom>
-          <a:noFill/>
-          <a:ln w="0">
-            <a:noFill/>
-          </a:ln>
-        </p:spPr>
-        <p:txBody>
-          <a:bodyPr lIns="0" rIns="0" tIns="0" bIns="0" anchor="ctr">
-            <a:noAutofit/>
-          </a:bodyPr>
-          <a:p>
-            <a:pPr indent="0">
-              <a:lnSpc>
-                <a:spcPct val="100000"/>
-              </a:lnSpc>
-              <a:buNone/>
-              <a:tabLst>
-                <a:tab algn="l" pos="0"/>
-              </a:tabLst>
-            </a:pPr>
-            <a:r>
-              <a:rPr b="0" lang="fr-FR" sz="1800" strike="noStrike" u="none">
-                <a:solidFill>
-                  <a:srgbClr val="000000"/>
-                </a:solidFill>
-                <a:uFillTx/>
-                <a:latin typeface="Arial"/>
-              </a:rPr>
-              <a:t>Tableau kanban</a:t>
-            </a:r>
-            <a:endParaRPr b="0" lang="fr-FR" sz="1800" strike="noStrike" u="none">
-              <a:solidFill>
-                <a:srgbClr val="000000"/>
-              </a:solidFill>
-              <a:uFillTx/>
-              <a:latin typeface="Arial"/>
-            </a:endParaRPr>
-          </a:p>
-        </p:txBody>
-      </p:sp>
       <p:pic>
         <p:nvPicPr>
-          <p:cNvPr id="75" name="" descr=""/>
+          <p:cNvPr id="70" name="" descr=""/>
           <p:cNvPicPr/>
           <p:nvPr/>
         </p:nvPicPr>
@@ -4732,8 +4279,8 @@
         </p:blipFill>
         <p:spPr>
           <a:xfrm>
-            <a:off x="504000" y="900000"/>
-            <a:ext cx="8135280" cy="4242960"/>
+            <a:off x="90000" y="8280"/>
+            <a:ext cx="9003240" cy="5143320"/>
           </a:xfrm>
           <a:prstGeom prst="rect">
             <a:avLst/>
@@ -4775,7 +4322,7 @@
       </p:grpSpPr>
       <p:sp>
         <p:nvSpPr>
-          <p:cNvPr id="76" name="PlaceHolder 1"/>
+          <p:cNvPr id="71" name="PlaceHolder 1"/>
           <p:cNvSpPr>
             <a:spLocks noGrp="1"/>
           </p:cNvSpPr>
@@ -4786,7 +4333,7 @@
         <p:spPr>
           <a:xfrm>
             <a:off x="311760" y="444960"/>
-            <a:ext cx="8519400" cy="571680"/>
+            <a:ext cx="8519040" cy="571320"/>
           </a:xfrm>
           <a:prstGeom prst="rect">
             <a:avLst/>
@@ -4797,29 +4344,370 @@
           </a:ln>
         </p:spPr>
         <p:txBody>
-          <a:bodyPr lIns="0" rIns="0" tIns="0" bIns="0" anchor="ctr">
-            <a:noAutofit/>
+          <a:bodyPr lIns="91440" rIns="91440" tIns="91440" bIns="91440" anchor="t">
+            <a:normAutofit/>
           </a:bodyPr>
           <a:p>
             <a:pPr indent="0">
               <a:lnSpc>
-                <a:spcPct val="100000"/>
-              </a:lnSpc>
+                <a:spcPct val="115000"/>
+              </a:lnSpc>
+              <a:spcAft>
+                <a:spcPts val="1199"/>
+              </a:spcAft>
               <a:buNone/>
               <a:tabLst>
                 <a:tab algn="l" pos="0"/>
               </a:tabLst>
             </a:pPr>
             <a:r>
-              <a:rPr b="0" lang="fr-FR" sz="1400" strike="noStrike" u="none">
+              <a:rPr b="0" lang="fr" sz="2000" strike="noStrike" u="none">
+                <a:solidFill>
+                  <a:schemeClr val="dk1"/>
+                </a:solidFill>
+                <a:uFillTx/>
+                <a:latin typeface="Montserrat"/>
+                <a:ea typeface="Montserrat"/>
+              </a:rPr>
+              <a:t>Suivi du projet avec le Kanban</a:t>
+            </a:r>
+            <a:endParaRPr b="0" lang="fr-FR" sz="2000" strike="noStrike" u="none">
+              <a:solidFill>
+                <a:srgbClr val="000000"/>
+              </a:solidFill>
+              <a:uFillTx/>
+              <a:latin typeface="Arial"/>
+            </a:endParaRPr>
+          </a:p>
+        </p:txBody>
+      </p:sp>
+      <p:sp>
+        <p:nvSpPr>
+          <p:cNvPr id="72" name="PlaceHolder 2"/>
+          <p:cNvSpPr>
+            <a:spLocks noGrp="1"/>
+          </p:cNvSpPr>
+          <p:nvPr>
+            <p:ph/>
+          </p:nvPr>
+        </p:nvSpPr>
+        <p:spPr>
+          <a:xfrm>
+            <a:off x="311760" y="1152360"/>
+            <a:ext cx="8519040" cy="3414960"/>
+          </a:xfrm>
+          <a:prstGeom prst="rect">
+            <a:avLst/>
+          </a:prstGeom>
+          <a:noFill/>
+          <a:ln w="0">
+            <a:noFill/>
+          </a:ln>
+        </p:spPr>
+        <p:txBody>
+          <a:bodyPr lIns="91440" rIns="91440" tIns="91440" bIns="91440" anchor="t">
+            <a:normAutofit/>
+          </a:bodyPr>
+          <a:p>
+            <a:pPr indent="0">
+              <a:lnSpc>
+                <a:spcPct val="115000"/>
+              </a:lnSpc>
+              <a:buNone/>
+              <a:tabLst>
+                <a:tab algn="l" pos="0"/>
+              </a:tabLst>
+            </a:pPr>
+            <a:endParaRPr b="0" lang="fr-FR" sz="1800" strike="noStrike" u="none">
+              <a:solidFill>
+                <a:srgbClr val="000000"/>
+              </a:solidFill>
+              <a:uFillTx/>
+              <a:latin typeface="Arial"/>
+            </a:endParaRPr>
+          </a:p>
+          <a:p>
+            <a:pPr indent="0">
+              <a:lnSpc>
+                <a:spcPct val="115000"/>
+              </a:lnSpc>
+              <a:spcBef>
+                <a:spcPts val="1199"/>
+              </a:spcBef>
+              <a:buNone/>
+              <a:tabLst>
+                <a:tab algn="l" pos="0"/>
+              </a:tabLst>
+            </a:pPr>
+            <a:endParaRPr b="0" lang="fr-FR" sz="1800" strike="noStrike" u="none">
+              <a:solidFill>
+                <a:srgbClr val="000000"/>
+              </a:solidFill>
+              <a:uFillTx/>
+              <a:latin typeface="Arial"/>
+            </a:endParaRPr>
+          </a:p>
+          <a:p>
+            <a:pPr marL="457200" indent="0">
+              <a:lnSpc>
+                <a:spcPct val="115000"/>
+              </a:lnSpc>
+              <a:spcBef>
+                <a:spcPts val="1199"/>
+              </a:spcBef>
+              <a:spcAft>
+                <a:spcPts val="1199"/>
+              </a:spcAft>
+              <a:buNone/>
+              <a:tabLst>
+                <a:tab algn="l" pos="0"/>
+              </a:tabLst>
+            </a:pPr>
+            <a:endParaRPr b="0" lang="fr-FR" sz="1800" strike="noStrike" u="none">
+              <a:solidFill>
+                <a:srgbClr val="000000"/>
+              </a:solidFill>
+              <a:uFillTx/>
+              <a:latin typeface="Arial"/>
+            </a:endParaRPr>
+          </a:p>
+        </p:txBody>
+      </p:sp>
+      <p:sp>
+        <p:nvSpPr>
+          <p:cNvPr id="73" name="Google Shape;94;p18"/>
+          <p:cNvSpPr/>
+          <p:nvPr/>
+        </p:nvSpPr>
+        <p:spPr>
+          <a:xfrm>
+            <a:off x="434880" y="1085400"/>
+            <a:ext cx="8319240" cy="1801800"/>
+          </a:xfrm>
+          <a:prstGeom prst="rect">
+            <a:avLst/>
+          </a:prstGeom>
+          <a:noFill/>
+          <a:ln w="0">
+            <a:noFill/>
+          </a:ln>
+        </p:spPr>
+        <p:style>
+          <a:lnRef idx="0"/>
+          <a:fillRef idx="0"/>
+          <a:effectRef idx="0"/>
+          <a:fontRef idx="minor"/>
+        </p:style>
+        <p:txBody>
+          <a:bodyPr lIns="90000" rIns="90000" tIns="91440" bIns="91440" anchor="t">
+            <a:spAutoFit/>
+          </a:bodyPr>
+          <a:p>
+            <a:pPr marL="457200" indent="-324000">
+              <a:lnSpc>
+                <a:spcPct val="150000"/>
+              </a:lnSpc>
+              <a:buClr>
+                <a:srgbClr val="0d0d0d"/>
+              </a:buClr>
+              <a:buFont typeface="Montserrat"/>
+              <a:buChar char="●"/>
+            </a:pPr>
+            <a:r>
+              <a:rPr b="0" lang="fr" sz="1500" strike="noStrike" u="none">
+                <a:solidFill>
+                  <a:srgbClr val="0d0d0d"/>
+                </a:solidFill>
+                <a:highlight>
+                  <a:srgbClr val="ffffff"/>
+                </a:highlight>
+                <a:uFillTx/>
+                <a:latin typeface="Montserrat"/>
+                <a:ea typeface="Montserrat"/>
+              </a:rPr>
+              <a:t>Capture(s) d'écran du tableau Kanban.</a:t>
+            </a:r>
+            <a:endParaRPr b="0" lang="fr-FR" sz="1500" strike="noStrike" u="none">
+              <a:solidFill>
+                <a:srgbClr val="000000"/>
+              </a:solidFill>
+              <a:uFillTx/>
+              <a:latin typeface="Arial"/>
+            </a:endParaRPr>
+          </a:p>
+          <a:p>
+            <a:pPr marL="457200" indent="-324000">
+              <a:lnSpc>
+                <a:spcPct val="150000"/>
+              </a:lnSpc>
+              <a:buClr>
+                <a:srgbClr val="0d0d0d"/>
+              </a:buClr>
+              <a:buFont typeface="Montserrat"/>
+              <a:buChar char="●"/>
+            </a:pPr>
+            <a:r>
+              <a:rPr b="0" lang="fr" sz="1500" strike="noStrike" u="none">
+                <a:solidFill>
+                  <a:srgbClr val="0d0d0d"/>
+                </a:solidFill>
+                <a:highlight>
+                  <a:srgbClr val="ffffff"/>
+                </a:highlight>
+                <a:uFillTx/>
+                <a:latin typeface="Montserrat"/>
+                <a:ea typeface="Montserrat"/>
+              </a:rPr>
+              <a:t>Explication des User Stories (US), tâches attribuées, etc.</a:t>
+            </a:r>
+            <a:endParaRPr b="0" lang="fr-FR" sz="1500" strike="noStrike" u="none">
+              <a:solidFill>
+                <a:srgbClr val="000000"/>
+              </a:solidFill>
+              <a:uFillTx/>
+              <a:latin typeface="Arial"/>
+            </a:endParaRPr>
+          </a:p>
+          <a:p>
+            <a:pPr marL="457200" indent="-324000">
+              <a:lnSpc>
+                <a:spcPct val="150000"/>
+              </a:lnSpc>
+              <a:buClr>
+                <a:srgbClr val="0d0d0d"/>
+              </a:buClr>
+              <a:buFont typeface="Montserrat"/>
+              <a:buChar char="●"/>
+            </a:pPr>
+            <a:r>
+              <a:rPr b="0" lang="fr" sz="1500" strike="noStrike" u="none">
+                <a:solidFill>
+                  <a:srgbClr val="0d0d0d"/>
+                </a:solidFill>
+                <a:highlight>
+                  <a:srgbClr val="ffffff"/>
+                </a:highlight>
+                <a:uFillTx/>
+                <a:latin typeface="Montserrat"/>
+                <a:ea typeface="Montserrat"/>
+              </a:rPr>
+              <a:t>Explication de comment le tableau facilite le suivi et la coordination de l'équipe.</a:t>
+            </a:r>
+            <a:endParaRPr b="0" lang="fr-FR" sz="1500" strike="noStrike" u="none">
+              <a:solidFill>
+                <a:srgbClr val="000000"/>
+              </a:solidFill>
+              <a:uFillTx/>
+              <a:latin typeface="Arial"/>
+            </a:endParaRPr>
+          </a:p>
+          <a:p>
+            <a:pPr>
+              <a:lnSpc>
+                <a:spcPct val="115000"/>
+              </a:lnSpc>
+              <a:tabLst>
+                <a:tab algn="l" pos="0"/>
+              </a:tabLst>
+            </a:pPr>
+            <a:endParaRPr b="0" lang="fr-FR" sz="1200" strike="noStrike" u="none">
+              <a:solidFill>
+                <a:srgbClr val="000000"/>
+              </a:solidFill>
+              <a:uFillTx/>
+              <a:latin typeface="Arial"/>
+            </a:endParaRPr>
+          </a:p>
+          <a:p>
+            <a:pPr>
+              <a:lnSpc>
+                <a:spcPct val="100000"/>
+              </a:lnSpc>
+              <a:spcBef>
+                <a:spcPts val="1199"/>
+              </a:spcBef>
+              <a:tabLst>
+                <a:tab algn="l" pos="0"/>
+              </a:tabLst>
+            </a:pPr>
+            <a:r>
+              <a:rPr b="0" lang="fr" sz="1400" strike="noStrike" u="none">
                 <a:solidFill>
                   <a:srgbClr val="000000"/>
                 </a:solidFill>
                 <a:uFillTx/>
-                <a:latin typeface="Arial"/>
-              </a:rPr>
-              <a:t>Tableau kanban</a:t>
+                <a:latin typeface="Montserrat"/>
+                <a:ea typeface="Montserrat"/>
+              </a:rPr>
+              <a:t>Ne pas oublier </a:t>
             </a:r>
+            <a:r>
+              <a:rPr b="0" lang="fr" sz="1500" strike="noStrike" u="none">
+                <a:solidFill>
+                  <a:srgbClr val="0d0d0d"/>
+                </a:solidFill>
+                <a:highlight>
+                  <a:srgbClr val="ffffff"/>
+                </a:highlight>
+                <a:uFillTx/>
+                <a:latin typeface="Montserrat"/>
+                <a:ea typeface="Montserrat"/>
+              </a:rPr>
+              <a:t>la mise en public du lien du tableau</a:t>
+            </a:r>
+            <a:endParaRPr b="0" lang="fr-FR" sz="1500" strike="noStrike" u="none">
+              <a:solidFill>
+                <a:srgbClr val="000000"/>
+              </a:solidFill>
+              <a:uFillTx/>
+              <a:latin typeface="Arial"/>
+            </a:endParaRPr>
+          </a:p>
+        </p:txBody>
+      </p:sp>
+      <p:sp>
+        <p:nvSpPr>
+          <p:cNvPr id="74" name="Google Shape;95;p18"/>
+          <p:cNvSpPr/>
+          <p:nvPr/>
+        </p:nvSpPr>
+        <p:spPr>
+          <a:xfrm>
+            <a:off x="-4680" y="0"/>
+            <a:ext cx="9152280" cy="238320"/>
+          </a:xfrm>
+          <a:prstGeom prst="rect">
+            <a:avLst/>
+          </a:prstGeom>
+          <a:solidFill>
+            <a:srgbClr val="fce5cd"/>
+          </a:solidFill>
+          <a:ln w="9525">
+            <a:solidFill>
+              <a:srgbClr val="f7edde"/>
+            </a:solidFill>
+            <a:round/>
+          </a:ln>
+        </p:spPr>
+        <p:style>
+          <a:lnRef idx="0"/>
+          <a:fillRef idx="0"/>
+          <a:effectRef idx="0"/>
+          <a:fontRef idx="minor"/>
+        </p:style>
+        <p:txBody>
+          <a:bodyPr lIns="90000" rIns="90000" tIns="91440" bIns="91440" anchor="ctr">
+            <a:noAutofit/>
+          </a:bodyPr>
+          <a:p>
+            <a:pPr algn="ctr">
+              <a:lnSpc>
+                <a:spcPct val="100000"/>
+              </a:lnSpc>
+              <a:tabLst>
+                <a:tab algn="l" pos="0"/>
+              </a:tabLst>
+            </a:pPr>
             <a:endParaRPr b="0" lang="fr-FR" sz="1400" strike="noStrike" u="none">
               <a:solidFill>
                 <a:srgbClr val="000000"/>
@@ -4832,7 +4720,7 @@
       </p:sp>
       <p:pic>
         <p:nvPicPr>
-          <p:cNvPr id="77" name="" descr=""/>
+          <p:cNvPr id="75" name="Google Shape;96;p18" descr=""/>
           <p:cNvPicPr/>
           <p:nvPr/>
         </p:nvPicPr>
@@ -4842,8 +4730,8 @@
         </p:blipFill>
         <p:spPr>
           <a:xfrm>
-            <a:off x="720000" y="988920"/>
-            <a:ext cx="7559280" cy="4154040"/>
+            <a:off x="8469720" y="0"/>
+            <a:ext cx="672840" cy="339120"/>
           </a:xfrm>
           <a:prstGeom prst="rect">
             <a:avLst/>
@@ -4885,7 +4773,7 @@
       </p:grpSpPr>
       <p:sp>
         <p:nvSpPr>
-          <p:cNvPr id="78" name="PlaceHolder 1"/>
+          <p:cNvPr id="76" name="PlaceHolder 1"/>
           <p:cNvSpPr>
             <a:spLocks noGrp="1"/>
           </p:cNvSpPr>
@@ -4895,8 +4783,8 @@
         </p:nvSpPr>
         <p:spPr>
           <a:xfrm>
-            <a:off x="263880" y="0"/>
-            <a:ext cx="8519400" cy="2051640"/>
+            <a:off x="180000" y="180000"/>
+            <a:ext cx="8519040" cy="571320"/>
           </a:xfrm>
           <a:prstGeom prst="rect">
             <a:avLst/>
@@ -4911,7 +4799,7 @@
             <a:noAutofit/>
           </a:bodyPr>
           <a:p>
-            <a:pPr indent="0" algn="ctr">
+            <a:pPr indent="0">
               <a:lnSpc>
                 <a:spcPct val="100000"/>
               </a:lnSpc>
@@ -4921,16 +4809,16 @@
               </a:tabLst>
             </a:pPr>
             <a:r>
-              <a:rPr b="0" lang="fr-FR" sz="4400" strike="noStrike" u="none">
+              <a:rPr b="0" lang="fr-FR" sz="1800" strike="noStrike" u="none">
                 <a:solidFill>
                   <a:srgbClr val="000000"/>
                 </a:solidFill>
                 <a:uFillTx/>
                 <a:latin typeface="Arial"/>
               </a:rPr>
-              <a:t>Stack MERN</a:t>
+              <a:t>Tableau kanban</a:t>
             </a:r>
-            <a:endParaRPr b="0" lang="fr-FR" sz="4400" strike="noStrike" u="none">
+            <a:endParaRPr b="0" lang="fr-FR" sz="1800" strike="noStrike" u="none">
               <a:solidFill>
                 <a:srgbClr val="000000"/>
               </a:solidFill>
@@ -4942,7 +4830,7 @@
       </p:sp>
       <p:pic>
         <p:nvPicPr>
-          <p:cNvPr id="79" name="" descr=""/>
+          <p:cNvPr id="77" name="" descr=""/>
           <p:cNvPicPr/>
           <p:nvPr/>
         </p:nvPicPr>
@@ -4952,8 +4840,8 @@
         </p:blipFill>
         <p:spPr>
           <a:xfrm>
-            <a:off x="540000" y="1363680"/>
-            <a:ext cx="7938000" cy="3779640"/>
+            <a:off x="504000" y="900000"/>
+            <a:ext cx="8134920" cy="4242600"/>
           </a:xfrm>
           <a:prstGeom prst="rect">
             <a:avLst/>
@@ -4995,7 +4883,7 @@
       </p:grpSpPr>
       <p:sp>
         <p:nvSpPr>
-          <p:cNvPr id="80" name="PlaceHolder 1"/>
+          <p:cNvPr id="78" name="PlaceHolder 1"/>
           <p:cNvSpPr>
             <a:spLocks noGrp="1"/>
           </p:cNvSpPr>
@@ -5006,7 +4894,7 @@
         <p:spPr>
           <a:xfrm>
             <a:off x="311760" y="444960"/>
-            <a:ext cx="8519400" cy="571680"/>
+            <a:ext cx="8519040" cy="571320"/>
           </a:xfrm>
           <a:prstGeom prst="rect">
             <a:avLst/>
@@ -5017,391 +4905,29 @@
           </a:ln>
         </p:spPr>
         <p:txBody>
-          <a:bodyPr lIns="91440" rIns="91440" tIns="91440" bIns="91440" anchor="t">
-            <a:normAutofit/>
+          <a:bodyPr lIns="0" rIns="0" tIns="0" bIns="0" anchor="ctr">
+            <a:noAutofit/>
           </a:bodyPr>
           <a:p>
             <a:pPr indent="0">
               <a:lnSpc>
-                <a:spcPct val="115000"/>
-              </a:lnSpc>
-              <a:spcAft>
-                <a:spcPts val="1199"/>
-              </a:spcAft>
+                <a:spcPct val="100000"/>
+              </a:lnSpc>
               <a:buNone/>
               <a:tabLst>
                 <a:tab algn="l" pos="0"/>
               </a:tabLst>
             </a:pPr>
             <a:r>
-              <a:rPr b="0" lang="fr" sz="1800" strike="noStrike" u="none">
-                <a:solidFill>
-                  <a:schemeClr val="dk1"/>
-                </a:solidFill>
-                <a:uFillTx/>
-                <a:latin typeface="Montserrat"/>
-                <a:ea typeface="Montserrat"/>
-              </a:rPr>
-              <a:t>Spécifications techniques</a:t>
+              <a:rPr b="0" lang="fr-FR" sz="1400" strike="noStrike" u="none">
+                <a:solidFill>
+                  <a:srgbClr val="000000"/>
+                </a:solidFill>
+                <a:uFillTx/>
+                <a:latin typeface="Arial"/>
+              </a:rPr>
+              <a:t>Tableau kanban</a:t>
             </a:r>
-            <a:endParaRPr b="0" lang="fr-FR" sz="1800" strike="noStrike" u="none">
-              <a:solidFill>
-                <a:srgbClr val="000000"/>
-              </a:solidFill>
-              <a:uFillTx/>
-              <a:latin typeface="Arial"/>
-            </a:endParaRPr>
-          </a:p>
-        </p:txBody>
-      </p:sp>
-      <p:sp>
-        <p:nvSpPr>
-          <p:cNvPr id="81" name="PlaceHolder 2"/>
-          <p:cNvSpPr>
-            <a:spLocks noGrp="1"/>
-          </p:cNvSpPr>
-          <p:nvPr>
-            <p:ph/>
-          </p:nvPr>
-        </p:nvSpPr>
-        <p:spPr>
-          <a:xfrm>
-            <a:off x="311760" y="1152360"/>
-            <a:ext cx="8519400" cy="3415320"/>
-          </a:xfrm>
-          <a:prstGeom prst="rect">
-            <a:avLst/>
-          </a:prstGeom>
-          <a:noFill/>
-          <a:ln w="0">
-            <a:noFill/>
-          </a:ln>
-        </p:spPr>
-        <p:txBody>
-          <a:bodyPr lIns="91440" rIns="91440" tIns="91440" bIns="91440" anchor="t">
-            <a:normAutofit/>
-          </a:bodyPr>
-          <a:p>
-            <a:pPr indent="0">
-              <a:lnSpc>
-                <a:spcPct val="115000"/>
-              </a:lnSpc>
-              <a:buNone/>
-              <a:tabLst>
-                <a:tab algn="l" pos="0"/>
-              </a:tabLst>
-            </a:pPr>
-            <a:endParaRPr b="0" lang="fr-FR" sz="1800" strike="noStrike" u="none">
-              <a:solidFill>
-                <a:srgbClr val="000000"/>
-              </a:solidFill>
-              <a:uFillTx/>
-              <a:latin typeface="Arial"/>
-            </a:endParaRPr>
-          </a:p>
-          <a:p>
-            <a:pPr indent="0">
-              <a:lnSpc>
-                <a:spcPct val="115000"/>
-              </a:lnSpc>
-              <a:spcBef>
-                <a:spcPts val="1199"/>
-              </a:spcBef>
-              <a:buNone/>
-              <a:tabLst>
-                <a:tab algn="l" pos="0"/>
-              </a:tabLst>
-            </a:pPr>
-            <a:endParaRPr b="0" lang="fr-FR" sz="1800" strike="noStrike" u="none">
-              <a:solidFill>
-                <a:srgbClr val="000000"/>
-              </a:solidFill>
-              <a:uFillTx/>
-              <a:latin typeface="Arial"/>
-            </a:endParaRPr>
-          </a:p>
-          <a:p>
-            <a:pPr marL="457200" indent="0">
-              <a:lnSpc>
-                <a:spcPct val="115000"/>
-              </a:lnSpc>
-              <a:spcBef>
-                <a:spcPts val="1199"/>
-              </a:spcBef>
-              <a:spcAft>
-                <a:spcPts val="1199"/>
-              </a:spcAft>
-              <a:buNone/>
-              <a:tabLst>
-                <a:tab algn="l" pos="0"/>
-              </a:tabLst>
-            </a:pPr>
-            <a:endParaRPr b="0" lang="fr-FR" sz="1800" strike="noStrike" u="none">
-              <a:solidFill>
-                <a:srgbClr val="000000"/>
-              </a:solidFill>
-              <a:uFillTx/>
-              <a:latin typeface="Arial"/>
-            </a:endParaRPr>
-          </a:p>
-        </p:txBody>
-      </p:sp>
-      <p:sp>
-        <p:nvSpPr>
-          <p:cNvPr id="82" name="Google Shape;103;p19"/>
-          <p:cNvSpPr/>
-          <p:nvPr/>
-        </p:nvSpPr>
-        <p:spPr>
-          <a:xfrm>
-            <a:off x="0" y="0"/>
-            <a:ext cx="4910400" cy="351360"/>
-          </a:xfrm>
-          <a:prstGeom prst="rect">
-            <a:avLst/>
-          </a:prstGeom>
-          <a:noFill/>
-          <a:ln w="0">
-            <a:noFill/>
-          </a:ln>
-        </p:spPr>
-        <p:style>
-          <a:lnRef idx="0"/>
-          <a:fillRef idx="0"/>
-          <a:effectRef idx="0"/>
-          <a:fontRef idx="minor"/>
-        </p:style>
-        <p:txBody>
-          <a:bodyPr lIns="90000" rIns="90000" tIns="88200" bIns="88200" anchor="t">
-            <a:spAutoFit/>
-          </a:bodyPr>
-          <a:p>
-            <a:pPr>
-              <a:lnSpc>
-                <a:spcPct val="115000"/>
-              </a:lnSpc>
-              <a:spcAft>
-                <a:spcPts val="1199"/>
-              </a:spcAft>
-              <a:tabLst>
-                <a:tab algn="l" pos="0"/>
-              </a:tabLst>
-            </a:pPr>
-            <a:r>
-              <a:rPr b="0" lang="fr" sz="1000" strike="noStrike" u="none">
-                <a:solidFill>
-                  <a:schemeClr val="dk2"/>
-                </a:solidFill>
-                <a:uFillTx/>
-                <a:latin typeface="Montserrat"/>
-                <a:ea typeface="Montserrat"/>
-              </a:rPr>
-              <a:t>Présentation de l’usage du no-code</a:t>
-            </a:r>
-            <a:endParaRPr b="0" lang="fr-FR" sz="1000" strike="noStrike" u="none">
-              <a:solidFill>
-                <a:srgbClr val="000000"/>
-              </a:solidFill>
-              <a:uFillTx/>
-              <a:latin typeface="Arial"/>
-            </a:endParaRPr>
-          </a:p>
-        </p:txBody>
-      </p:sp>
-      <p:sp>
-        <p:nvSpPr>
-          <p:cNvPr id="83" name="Google Shape;104;p19"/>
-          <p:cNvSpPr/>
-          <p:nvPr/>
-        </p:nvSpPr>
-        <p:spPr>
-          <a:xfrm>
-            <a:off x="434880" y="1085400"/>
-            <a:ext cx="8319600" cy="1977120"/>
-          </a:xfrm>
-          <a:prstGeom prst="rect">
-            <a:avLst/>
-          </a:prstGeom>
-          <a:noFill/>
-          <a:ln w="0">
-            <a:noFill/>
-          </a:ln>
-        </p:spPr>
-        <p:style>
-          <a:lnRef idx="0"/>
-          <a:fillRef idx="0"/>
-          <a:effectRef idx="0"/>
-          <a:fontRef idx="minor"/>
-        </p:style>
-        <p:txBody>
-          <a:bodyPr lIns="90000" rIns="90000" tIns="91440" bIns="91440" anchor="t">
-            <a:spAutoFit/>
-          </a:bodyPr>
-          <a:p>
-            <a:pPr marL="457200" indent="-324000">
-              <a:lnSpc>
-                <a:spcPct val="150000"/>
-              </a:lnSpc>
-              <a:buClr>
-                <a:srgbClr val="0d0d0d"/>
-              </a:buClr>
-              <a:buFont typeface="Montserrat"/>
-              <a:buChar char="●"/>
-            </a:pPr>
-            <a:r>
-              <a:rPr b="0" lang="fr" sz="1500" strike="noStrike" u="none">
-                <a:solidFill>
-                  <a:srgbClr val="0d0d0d"/>
-                </a:solidFill>
-                <a:highlight>
-                  <a:srgbClr val="ffffff"/>
-                </a:highlight>
-                <a:uFillTx/>
-                <a:latin typeface="Montserrat"/>
-                <a:ea typeface="Montserrat"/>
-              </a:rPr>
-              <a:t>Liste des principales spécifications techniques.</a:t>
-            </a:r>
-            <a:endParaRPr b="0" lang="fr-FR" sz="1500" strike="noStrike" u="none">
-              <a:solidFill>
-                <a:srgbClr val="000000"/>
-              </a:solidFill>
-              <a:uFillTx/>
-              <a:latin typeface="Arial"/>
-            </a:endParaRPr>
-          </a:p>
-          <a:p>
-            <a:pPr marL="457200" indent="-324000">
-              <a:lnSpc>
-                <a:spcPct val="150000"/>
-              </a:lnSpc>
-              <a:buClr>
-                <a:srgbClr val="0d0d0d"/>
-              </a:buClr>
-              <a:buFont typeface="Montserrat"/>
-              <a:buChar char="●"/>
-            </a:pPr>
-            <a:r>
-              <a:rPr b="0" lang="fr" sz="1500" strike="noStrike" u="none">
-                <a:solidFill>
-                  <a:srgbClr val="0d0d0d"/>
-                </a:solidFill>
-                <a:highlight>
-                  <a:srgbClr val="ffffff"/>
-                </a:highlight>
-                <a:uFillTx/>
-                <a:latin typeface="Montserrat"/>
-                <a:ea typeface="Montserrat"/>
-              </a:rPr>
-              <a:t>Choix d'une spécification technique clé à vulgariser.</a:t>
-            </a:r>
-            <a:br>
-              <a:rPr sz="1500"/>
-            </a:br>
-            <a:r>
-              <a:rPr b="0" lang="fr" sz="1500" strike="noStrike" u="none">
-                <a:solidFill>
-                  <a:srgbClr val="0d0d0d"/>
-                </a:solidFill>
-                <a:highlight>
-                  <a:srgbClr val="ffffff"/>
-                </a:highlight>
-                <a:uFillTx/>
-                <a:latin typeface="Montserrat"/>
-                <a:ea typeface="Montserrat"/>
-              </a:rPr>
-              <a:t>-&gt; Présentation de cette spécification via un schéma explicatif, un diagramme ou un dessin.</a:t>
-            </a:r>
-            <a:endParaRPr b="0" lang="fr-FR" sz="1500" strike="noStrike" u="none">
-              <a:solidFill>
-                <a:srgbClr val="000000"/>
-              </a:solidFill>
-              <a:uFillTx/>
-              <a:latin typeface="Arial"/>
-            </a:endParaRPr>
-          </a:p>
-          <a:p>
-            <a:pPr>
-              <a:lnSpc>
-                <a:spcPct val="115000"/>
-              </a:lnSpc>
-              <a:tabLst>
-                <a:tab algn="l" pos="0"/>
-              </a:tabLst>
-            </a:pPr>
-            <a:endParaRPr b="0" lang="fr-FR" sz="1200" strike="noStrike" u="none">
-              <a:solidFill>
-                <a:srgbClr val="000000"/>
-              </a:solidFill>
-              <a:uFillTx/>
-              <a:latin typeface="Arial"/>
-            </a:endParaRPr>
-          </a:p>
-          <a:p>
-            <a:pPr>
-              <a:lnSpc>
-                <a:spcPct val="100000"/>
-              </a:lnSpc>
-              <a:spcBef>
-                <a:spcPts val="1199"/>
-              </a:spcBef>
-              <a:tabLst>
-                <a:tab algn="l" pos="0"/>
-              </a:tabLst>
-            </a:pPr>
-            <a:endParaRPr b="0" lang="fr-FR" sz="1400" strike="noStrike" u="none">
-              <a:solidFill>
-                <a:srgbClr val="000000"/>
-              </a:solidFill>
-              <a:uFillTx/>
-              <a:latin typeface="Arial"/>
-            </a:endParaRPr>
-          </a:p>
-        </p:txBody>
-      </p:sp>
-      <p:sp>
-        <p:nvSpPr>
-          <p:cNvPr id="84" name="Google Shape;105;p19"/>
-          <p:cNvSpPr/>
-          <p:nvPr/>
-        </p:nvSpPr>
-        <p:spPr>
-          <a:xfrm>
-            <a:off x="-4680" y="0"/>
-            <a:ext cx="9152640" cy="238680"/>
-          </a:xfrm>
-          <a:prstGeom prst="rect">
-            <a:avLst/>
-          </a:prstGeom>
-          <a:solidFill>
-            <a:srgbClr val="fce5cd"/>
-          </a:solidFill>
-          <a:ln w="9525">
-            <a:solidFill>
-              <a:srgbClr val="f7edde"/>
-            </a:solidFill>
-            <a:round/>
-          </a:ln>
-        </p:spPr>
-        <p:style>
-          <a:lnRef idx="0"/>
-          <a:fillRef idx="0"/>
-          <a:effectRef idx="0"/>
-          <a:fontRef idx="minor"/>
-        </p:style>
-        <p:txBody>
-          <a:bodyPr lIns="90000" rIns="90000" tIns="91440" bIns="91440" anchor="ctr">
-            <a:noAutofit/>
-          </a:bodyPr>
-          <a:p>
-            <a:pPr algn="ctr">
-              <a:lnSpc>
-                <a:spcPct val="100000"/>
-              </a:lnSpc>
-              <a:tabLst>
-                <a:tab algn="l" pos="0"/>
-              </a:tabLst>
-            </a:pPr>
             <a:endParaRPr b="0" lang="fr-FR" sz="1400" strike="noStrike" u="none">
               <a:solidFill>
                 <a:srgbClr val="000000"/>
@@ -5414,7 +4940,7 @@
       </p:sp>
       <p:pic>
         <p:nvPicPr>
-          <p:cNvPr id="85" name="Google Shape;106;p19" descr=""/>
+          <p:cNvPr id="79" name="" descr=""/>
           <p:cNvPicPr/>
           <p:nvPr/>
         </p:nvPicPr>
@@ -5424,8 +4950,8 @@
         </p:blipFill>
         <p:spPr>
           <a:xfrm>
-            <a:off x="8469720" y="0"/>
-            <a:ext cx="673200" cy="339480"/>
+            <a:off x="720000" y="988920"/>
+            <a:ext cx="7558920" cy="4153680"/>
           </a:xfrm>
           <a:prstGeom prst="rect">
             <a:avLst/>
@@ -5467,7 +4993,7 @@
       </p:grpSpPr>
       <p:sp>
         <p:nvSpPr>
-          <p:cNvPr id="86" name="PlaceHolder 1"/>
+          <p:cNvPr id="80" name="PlaceHolder 1"/>
           <p:cNvSpPr>
             <a:spLocks noGrp="1"/>
           </p:cNvSpPr>
@@ -5478,7 +5004,7 @@
         <p:spPr>
           <a:xfrm>
             <a:off x="311760" y="444960"/>
-            <a:ext cx="8519400" cy="571680"/>
+            <a:ext cx="8519040" cy="571320"/>
           </a:xfrm>
           <a:prstGeom prst="rect">
             <a:avLst/>
@@ -5506,7 +5032,7 @@
               </a:tabLst>
             </a:pPr>
             <a:r>
-              <a:rPr b="0" lang="fr" sz="2000" strike="noStrike" u="none">
+              <a:rPr b="0" lang="fr" sz="1800" strike="noStrike" u="none">
                 <a:solidFill>
                   <a:schemeClr val="dk1"/>
                 </a:solidFill>
@@ -5514,9 +5040,9 @@
                 <a:latin typeface="Montserrat"/>
                 <a:ea typeface="Montserrat"/>
               </a:rPr>
-              <a:t>Veille Technologique</a:t>
+              <a:t>Spécifications techniques</a:t>
             </a:r>
-            <a:endParaRPr b="0" lang="fr-FR" sz="2000" strike="noStrike" u="none">
+            <a:endParaRPr b="0" lang="fr-FR" sz="1800" strike="noStrike" u="none">
               <a:solidFill>
                 <a:srgbClr val="000000"/>
               </a:solidFill>
@@ -5528,7 +5054,7 @@
       </p:sp>
       <p:sp>
         <p:nvSpPr>
-          <p:cNvPr id="87" name="PlaceHolder 2"/>
+          <p:cNvPr id="81" name="PlaceHolder 2"/>
           <p:cNvSpPr>
             <a:spLocks noGrp="1"/>
           </p:cNvSpPr>
@@ -5539,7 +5065,7 @@
         <p:spPr>
           <a:xfrm>
             <a:off x="311760" y="1152360"/>
-            <a:ext cx="8519400" cy="3415320"/>
+            <a:ext cx="8519040" cy="3414960"/>
           </a:xfrm>
           <a:prstGeom prst="rect">
             <a:avLst/>
@@ -5620,14 +5146,14 @@
       </p:sp>
       <p:sp>
         <p:nvSpPr>
-          <p:cNvPr id="88" name="Google Shape;113;p20"/>
+          <p:cNvPr id="82" name="Google Shape;103;p19"/>
           <p:cNvSpPr/>
           <p:nvPr/>
         </p:nvSpPr>
         <p:spPr>
           <a:xfrm>
             <a:off x="0" y="0"/>
-            <a:ext cx="4910400" cy="351360"/>
+            <a:ext cx="4910040" cy="351360"/>
           </a:xfrm>
           <a:prstGeom prst="rect">
             <a:avLst/>
@@ -5682,14 +5208,14 @@
       </p:sp>
       <p:sp>
         <p:nvSpPr>
-          <p:cNvPr id="89" name="Google Shape;114;p20"/>
+          <p:cNvPr id="83" name="Google Shape;104;p19"/>
           <p:cNvSpPr/>
           <p:nvPr/>
         </p:nvSpPr>
         <p:spPr>
           <a:xfrm>
             <a:off x="434880" y="1085400"/>
-            <a:ext cx="8319600" cy="1977120"/>
+            <a:ext cx="8319240" cy="1977120"/>
           </a:xfrm>
           <a:prstGeom prst="rect">
             <a:avLst/>
@@ -5732,7 +5258,7 @@
                 <a:latin typeface="Montserrat"/>
                 <a:ea typeface="Montserrat"/>
               </a:rPr>
-              <a:t>Captures d’écran de la veille (max 5)</a:t>
+              <a:t>Liste des principales spécifications techniques.</a:t>
             </a:r>
             <a:endParaRPr b="0" lang="fr-FR" sz="1500" strike="noStrike" u="none">
               <a:solidFill>
@@ -5765,27 +5291,11 @@
                 <a:latin typeface="Montserrat"/>
                 <a:ea typeface="Montserrat"/>
               </a:rPr>
-              <a:t>Méthode de classification des sources d'information.</a:t>
+              <a:t>Choix d'une spécification technique clé à vulgariser.</a:t>
             </a:r>
-            <a:endParaRPr b="0" lang="fr-FR" sz="1500" strike="noStrike" u="none">
-              <a:solidFill>
-                <a:srgbClr val="000000"/>
-              </a:solidFill>
-              <a:uFillTx/>
-              <a:latin typeface="Arial"/>
-            </a:endParaRPr>
-          </a:p>
-          <a:p>
-            <a:pPr marL="457200" indent="-324000">
-              <a:lnSpc>
-                <a:spcPct val="150000"/>
-              </a:lnSpc>
-              <a:buClr>
-                <a:srgbClr val="0d0d0d"/>
-              </a:buClr>
-              <a:buFont typeface="Montserrat"/>
-              <a:buChar char="●"/>
-            </a:pPr>
+            <a:br>
+              <a:rPr sz="1500"/>
+            </a:br>
             <a:r>
               <a:rPr b="0" lang="fr" sz="1500" strike="noStrike" u="none">
                 <a:solidFill>
@@ -5798,40 +5308,7 @@
                 <a:latin typeface="Montserrat"/>
                 <a:ea typeface="Montserrat"/>
               </a:rPr>
-              <a:t>Exemple et explication du choix d’une source pour chacun des 2 axes de veille </a:t>
-            </a:r>
-            <a:endParaRPr b="0" lang="fr-FR" sz="1500" strike="noStrike" u="none">
-              <a:solidFill>
-                <a:srgbClr val="000000"/>
-              </a:solidFill>
-              <a:uFillTx/>
-              <a:latin typeface="Arial"/>
-            </a:endParaRPr>
-          </a:p>
-          <a:p>
-            <a:pPr marL="457200" indent="-324000">
-              <a:lnSpc>
-                <a:spcPct val="150000"/>
-              </a:lnSpc>
-              <a:buClr>
-                <a:srgbClr val="0d0d0d"/>
-              </a:buClr>
-              <a:buFont typeface="Montserrat"/>
-              <a:buChar char="●"/>
-            </a:pPr>
-            <a:r>
-              <a:rPr b="0" lang="fr" sz="1500" strike="noStrike" u="none">
-                <a:solidFill>
-                  <a:srgbClr val="0d0d0d"/>
-                </a:solidFill>
-                <a:highlight>
-                  <a:srgbClr val="ffffff"/>
-                </a:highlight>
-                <a:uFillTx/>
-                <a:latin typeface="Montserrat"/>
-                <a:ea typeface="Montserrat"/>
-              </a:rPr>
-              <a:t>Explication de la contribution de la veille à l'élaboration des spécifications techniques.</a:t>
+              <a:t>-&gt; Présentation de cette spécification via un schéma explicatif, un diagramme ou un dessin.</a:t>
             </a:r>
             <a:endParaRPr b="0" lang="fr-FR" sz="1500" strike="noStrike" u="none">
               <a:solidFill>
@@ -5882,14 +5359,14 @@
       </p:sp>
       <p:sp>
         <p:nvSpPr>
-          <p:cNvPr id="90" name="Google Shape;115;p20"/>
+          <p:cNvPr id="84" name="Google Shape;105;p19"/>
           <p:cNvSpPr/>
           <p:nvPr/>
         </p:nvSpPr>
         <p:spPr>
           <a:xfrm>
             <a:off x="-4680" y="0"/>
-            <a:ext cx="9152640" cy="238680"/>
+            <a:ext cx="9152280" cy="238320"/>
           </a:xfrm>
           <a:prstGeom prst="rect">
             <a:avLst/>
@@ -5935,7 +5412,7 @@
       </p:sp>
       <p:pic>
         <p:nvPicPr>
-          <p:cNvPr id="91" name="Google Shape;116;p20" descr=""/>
+          <p:cNvPr id="85" name="Google Shape;106;p19" descr=""/>
           <p:cNvPicPr/>
           <p:nvPr/>
         </p:nvPicPr>
@@ -5946,7 +5423,7 @@
         <p:spPr>
           <a:xfrm>
             <a:off x="8469720" y="0"/>
-            <a:ext cx="673200" cy="339480"/>
+            <a:ext cx="672840" cy="339120"/>
           </a:xfrm>
           <a:prstGeom prst="rect">
             <a:avLst/>
@@ -5988,7 +5465,7 @@
       </p:grpSpPr>
       <p:sp>
         <p:nvSpPr>
-          <p:cNvPr id="92" name="PlaceHolder 1"/>
+          <p:cNvPr id="86" name="PlaceHolder 1"/>
           <p:cNvSpPr>
             <a:spLocks noGrp="1"/>
           </p:cNvSpPr>
@@ -5998,8 +5475,8 @@
         </p:nvSpPr>
         <p:spPr>
           <a:xfrm>
-            <a:off x="120240" y="-432000"/>
-            <a:ext cx="8519400" cy="2051640"/>
+            <a:off x="263880" y="0"/>
+            <a:ext cx="8519040" cy="2051280"/>
           </a:xfrm>
           <a:prstGeom prst="rect">
             <a:avLst/>
@@ -6031,53 +5508,9 @@
                 <a:uFillTx/>
                 <a:latin typeface="Arial"/>
               </a:rPr>
-              <a:t>Veille </a:t>
+              <a:t>Stack MERN</a:t>
             </a:r>
             <a:endParaRPr b="0" lang="fr-FR" sz="4400" strike="noStrike" u="none">
-              <a:solidFill>
-                <a:srgbClr val="000000"/>
-              </a:solidFill>
-              <a:uFillTx/>
-              <a:latin typeface="Arial"/>
-            </a:endParaRPr>
-          </a:p>
-        </p:txBody>
-      </p:sp>
-      <p:sp>
-        <p:nvSpPr>
-          <p:cNvPr id="93" name="PlaceHolder 2"/>
-          <p:cNvSpPr>
-            <a:spLocks noGrp="1"/>
-          </p:cNvSpPr>
-          <p:nvPr>
-            <p:ph/>
-          </p:nvPr>
-        </p:nvSpPr>
-        <p:spPr>
-          <a:xfrm>
-            <a:off x="180000" y="1260000"/>
-            <a:ext cx="8228520" cy="2982240"/>
-          </a:xfrm>
-          <a:prstGeom prst="rect">
-            <a:avLst/>
-          </a:prstGeom>
-          <a:noFill/>
-          <a:ln w="0">
-            <a:noFill/>
-          </a:ln>
-        </p:spPr>
-        <p:txBody>
-          <a:bodyPr lIns="0" rIns="0" tIns="0" bIns="0" anchor="t">
-            <a:normAutofit/>
-          </a:bodyPr>
-          <a:p>
-            <a:pPr indent="0">
-              <a:spcBef>
-                <a:spcPts val="1417"/>
-              </a:spcBef>
-              <a:buNone/>
-            </a:pPr>
-            <a:endParaRPr b="0" lang="fr-FR" sz="1800" strike="noStrike" u="none">
               <a:solidFill>
                 <a:srgbClr val="000000"/>
               </a:solidFill>
@@ -6089,7 +5522,7 @@
       </p:sp>
       <p:pic>
         <p:nvPicPr>
-          <p:cNvPr id="94" name="" descr=""/>
+          <p:cNvPr id="87" name="" descr=""/>
           <p:cNvPicPr/>
           <p:nvPr/>
         </p:nvPicPr>
@@ -6099,31 +5532,8 @@
         </p:blipFill>
         <p:spPr>
           <a:xfrm>
-            <a:off x="0" y="2700000"/>
-            <a:ext cx="4515840" cy="2519640"/>
-          </a:xfrm>
-          <a:prstGeom prst="rect">
-            <a:avLst/>
-          </a:prstGeom>
-          <a:ln w="0">
-            <a:noFill/>
-          </a:ln>
-        </p:spPr>
-      </p:pic>
-      <p:pic>
-        <p:nvPicPr>
-          <p:cNvPr id="95" name="" descr=""/>
-          <p:cNvPicPr/>
-          <p:nvPr/>
-        </p:nvPicPr>
-        <p:blipFill>
-          <a:blip r:embed="rId2"/>
-          <a:stretch/>
-        </p:blipFill>
-        <p:spPr>
-          <a:xfrm>
-            <a:off x="4500000" y="2700000"/>
-            <a:ext cx="4656960" cy="2519640"/>
+            <a:off x="540000" y="1363680"/>
+            <a:ext cx="7937640" cy="3779280"/>
           </a:xfrm>
           <a:prstGeom prst="rect">
             <a:avLst/>
@@ -6176,7 +5586,7 @@
         <p:spPr>
           <a:xfrm>
             <a:off x="311760" y="444960"/>
-            <a:ext cx="8519400" cy="571680"/>
+            <a:ext cx="8519040" cy="571320"/>
           </a:xfrm>
           <a:prstGeom prst="rect">
             <a:avLst/>
@@ -6234,7 +5644,7 @@
         <p:spPr>
           <a:xfrm>
             <a:off x="311760" y="1152360"/>
-            <a:ext cx="8519400" cy="3415320"/>
+            <a:ext cx="8519040" cy="3414960"/>
           </a:xfrm>
           <a:prstGeom prst="rect">
             <a:avLst/>
@@ -6548,7 +5958,7 @@
         <p:spPr>
           <a:xfrm>
             <a:off x="8469720" y="0"/>
-            <a:ext cx="673200" cy="339480"/>
+            <a:ext cx="672840" cy="339120"/>
           </a:xfrm>
           <a:prstGeom prst="rect">
             <a:avLst/>
@@ -6590,7 +6000,7 @@
       </p:grpSpPr>
       <p:sp>
         <p:nvSpPr>
-          <p:cNvPr id="96" name="PlaceHolder 1"/>
+          <p:cNvPr id="88" name="PlaceHolder 1"/>
           <p:cNvSpPr>
             <a:spLocks noGrp="1"/>
           </p:cNvSpPr>
@@ -6601,7 +6011,7 @@
         <p:spPr>
           <a:xfrm>
             <a:off x="311760" y="444960"/>
-            <a:ext cx="8519400" cy="571680"/>
+            <a:ext cx="8519040" cy="571320"/>
           </a:xfrm>
           <a:prstGeom prst="rect">
             <a:avLst/>
@@ -6637,7 +6047,7 @@
                 <a:latin typeface="Montserrat"/>
                 <a:ea typeface="Montserrat"/>
               </a:rPr>
-              <a:t>Conclusion</a:t>
+              <a:t>Veille Technologique</a:t>
             </a:r>
             <a:endParaRPr b="0" lang="fr-FR" sz="2000" strike="noStrike" u="none">
               <a:solidFill>
@@ -6651,7 +6061,7 @@
       </p:sp>
       <p:sp>
         <p:nvSpPr>
-          <p:cNvPr id="97" name="PlaceHolder 2"/>
+          <p:cNvPr id="89" name="PlaceHolder 2"/>
           <p:cNvSpPr>
             <a:spLocks noGrp="1"/>
           </p:cNvSpPr>
@@ -6662,7 +6072,7 @@
         <p:spPr>
           <a:xfrm>
             <a:off x="311760" y="1152360"/>
-            <a:ext cx="8519400" cy="3415320"/>
+            <a:ext cx="8519040" cy="3414960"/>
           </a:xfrm>
           <a:prstGeom prst="rect">
             <a:avLst/>
@@ -6743,14 +6153,14 @@
       </p:sp>
       <p:sp>
         <p:nvSpPr>
-          <p:cNvPr id="98" name="Google Shape;123;p21"/>
+          <p:cNvPr id="90" name="Google Shape;113;p20"/>
           <p:cNvSpPr/>
           <p:nvPr/>
         </p:nvSpPr>
         <p:spPr>
           <a:xfrm>
             <a:off x="0" y="0"/>
-            <a:ext cx="4910400" cy="351360"/>
+            <a:ext cx="4910040" cy="351360"/>
           </a:xfrm>
           <a:prstGeom prst="rect">
             <a:avLst/>
@@ -6805,14 +6215,14 @@
       </p:sp>
       <p:sp>
         <p:nvSpPr>
-          <p:cNvPr id="99" name="Google Shape;124;p21"/>
+          <p:cNvPr id="91" name="Google Shape;114;p20"/>
           <p:cNvSpPr/>
           <p:nvPr/>
         </p:nvSpPr>
         <p:spPr>
           <a:xfrm>
             <a:off x="434880" y="1085400"/>
-            <a:ext cx="8319600" cy="869040"/>
+            <a:ext cx="8319240" cy="1977120"/>
           </a:xfrm>
           <a:prstGeom prst="rect">
             <a:avLst/>
@@ -6833,9 +6243,9 @@
             <a:spAutoFit/>
           </a:bodyPr>
           <a:p>
-            <a:pPr marL="457200" indent="-343080">
-              <a:lnSpc>
-                <a:spcPct val="115000"/>
+            <a:pPr marL="457200" indent="-324000">
+              <a:lnSpc>
+                <a:spcPct val="150000"/>
               </a:lnSpc>
               <a:buClr>
                 <a:srgbClr val="0d0d0d"/>
@@ -6855,7 +6265,106 @@
                 <a:latin typeface="Montserrat"/>
                 <a:ea typeface="Montserrat"/>
               </a:rPr>
-              <a:t>Résumé des points clés de la présentation</a:t>
+              <a:t>Captures d’écran de la veille (max 5)</a:t>
+            </a:r>
+            <a:endParaRPr b="0" lang="fr-FR" sz="1500" strike="noStrike" u="none">
+              <a:solidFill>
+                <a:srgbClr val="000000"/>
+              </a:solidFill>
+              <a:uFillTx/>
+              <a:latin typeface="Arial"/>
+            </a:endParaRPr>
+          </a:p>
+          <a:p>
+            <a:pPr marL="457200" indent="-324000">
+              <a:lnSpc>
+                <a:spcPct val="150000"/>
+              </a:lnSpc>
+              <a:buClr>
+                <a:srgbClr val="0d0d0d"/>
+              </a:buClr>
+              <a:buFont typeface="Montserrat"/>
+              <a:buChar char="●"/>
+            </a:pPr>
+            <a:r>
+              <a:rPr b="0" lang="fr" sz="1500" strike="noStrike" u="none">
+                <a:solidFill>
+                  <a:srgbClr val="0d0d0d"/>
+                </a:solidFill>
+                <a:highlight>
+                  <a:srgbClr val="ffffff"/>
+                </a:highlight>
+                <a:uFillTx/>
+                <a:latin typeface="Montserrat"/>
+                <a:ea typeface="Montserrat"/>
+              </a:rPr>
+              <a:t>Méthode de classification des sources d'information.</a:t>
+            </a:r>
+            <a:endParaRPr b="0" lang="fr-FR" sz="1500" strike="noStrike" u="none">
+              <a:solidFill>
+                <a:srgbClr val="000000"/>
+              </a:solidFill>
+              <a:uFillTx/>
+              <a:latin typeface="Arial"/>
+            </a:endParaRPr>
+          </a:p>
+          <a:p>
+            <a:pPr marL="457200" indent="-324000">
+              <a:lnSpc>
+                <a:spcPct val="150000"/>
+              </a:lnSpc>
+              <a:buClr>
+                <a:srgbClr val="0d0d0d"/>
+              </a:buClr>
+              <a:buFont typeface="Montserrat"/>
+              <a:buChar char="●"/>
+            </a:pPr>
+            <a:r>
+              <a:rPr b="0" lang="fr" sz="1500" strike="noStrike" u="none">
+                <a:solidFill>
+                  <a:srgbClr val="0d0d0d"/>
+                </a:solidFill>
+                <a:highlight>
+                  <a:srgbClr val="ffffff"/>
+                </a:highlight>
+                <a:uFillTx/>
+                <a:latin typeface="Montserrat"/>
+                <a:ea typeface="Montserrat"/>
+              </a:rPr>
+              <a:t>Exemple et explication du choix d’une source pour chacun des 2 axes de veille </a:t>
+            </a:r>
+            <a:endParaRPr b="0" lang="fr-FR" sz="1500" strike="noStrike" u="none">
+              <a:solidFill>
+                <a:srgbClr val="000000"/>
+              </a:solidFill>
+              <a:uFillTx/>
+              <a:latin typeface="Arial"/>
+            </a:endParaRPr>
+          </a:p>
+          <a:p>
+            <a:pPr marL="457200" indent="-324000">
+              <a:lnSpc>
+                <a:spcPct val="150000"/>
+              </a:lnSpc>
+              <a:buClr>
+                <a:srgbClr val="0d0d0d"/>
+              </a:buClr>
+              <a:buFont typeface="Montserrat"/>
+              <a:buChar char="●"/>
+            </a:pPr>
+            <a:r>
+              <a:rPr b="0" lang="fr" sz="1500" strike="noStrike" u="none">
+                <a:solidFill>
+                  <a:srgbClr val="0d0d0d"/>
+                </a:solidFill>
+                <a:highlight>
+                  <a:srgbClr val="ffffff"/>
+                </a:highlight>
+                <a:uFillTx/>
+                <a:latin typeface="Montserrat"/>
+                <a:ea typeface="Montserrat"/>
+              </a:rPr>
+              <a:t>Explication de la contribution de la veille à l'élaboration des spécifications techniques.</a:t>
             </a:r>
             <a:endParaRPr b="0" lang="fr-FR" sz="1500" strike="noStrike" u="none">
               <a:solidFill>
@@ -6906,14 +6415,14 @@
       </p:sp>
       <p:sp>
         <p:nvSpPr>
-          <p:cNvPr id="100" name="Google Shape;125;p21"/>
+          <p:cNvPr id="92" name="Google Shape;115;p20"/>
           <p:cNvSpPr/>
           <p:nvPr/>
         </p:nvSpPr>
         <p:spPr>
           <a:xfrm>
             <a:off x="-4680" y="0"/>
-            <a:ext cx="9152640" cy="238680"/>
+            <a:ext cx="9152280" cy="238320"/>
           </a:xfrm>
           <a:prstGeom prst="rect">
             <a:avLst/>
@@ -6959,7 +6468,7 @@
       </p:sp>
       <p:pic>
         <p:nvPicPr>
-          <p:cNvPr id="101" name="Google Shape;126;p21" descr=""/>
+          <p:cNvPr id="93" name="Google Shape;116;p20" descr=""/>
           <p:cNvPicPr/>
           <p:nvPr/>
         </p:nvPicPr>
@@ -6970,7 +6479,7 @@
         <p:spPr>
           <a:xfrm>
             <a:off x="8469720" y="0"/>
-            <a:ext cx="673200" cy="339480"/>
+            <a:ext cx="672840" cy="339120"/>
           </a:xfrm>
           <a:prstGeom prst="rect">
             <a:avLst/>
@@ -6996,6 +6505,605 @@
 <file path=ppt/slides/slide21.xml><?xml version="1.0" encoding="utf-8"?>
 <p:sld xmlns:a="http://schemas.openxmlformats.org/drawingml/2006/main" xmlns:p="http://schemas.openxmlformats.org/presentationml/2006/main" xmlns:r="http://schemas.openxmlformats.org/officeDocument/2006/relationships" xmlns:p14="http://schemas.microsoft.com/office/powerpoint/2010/main" xmlns:p15="http://schemas.microsoft.com/office/powerpoint/2012/main" xmlns:mc="http://schemas.openxmlformats.org/markup-compatibility/2006">
   <p:cSld>
+    <p:spTree>
+      <p:nvGrpSpPr>
+        <p:cNvPr id="1" name=""/>
+        <p:cNvGrpSpPr/>
+        <p:nvPr/>
+      </p:nvGrpSpPr>
+      <p:grpSpPr>
+        <a:xfrm>
+          <a:off x="0" y="0"/>
+          <a:ext cx="0" cy="0"/>
+          <a:chOff x="0" y="0"/>
+          <a:chExt cx="0" cy="0"/>
+        </a:xfrm>
+      </p:grpSpPr>
+      <p:sp>
+        <p:nvSpPr>
+          <p:cNvPr id="94" name="PlaceHolder 1"/>
+          <p:cNvSpPr>
+            <a:spLocks noGrp="1"/>
+          </p:cNvSpPr>
+          <p:nvPr>
+            <p:ph type="title"/>
+          </p:nvPr>
+        </p:nvSpPr>
+        <p:spPr>
+          <a:xfrm>
+            <a:off x="120240" y="-432000"/>
+            <a:ext cx="8519040" cy="2051280"/>
+          </a:xfrm>
+          <a:prstGeom prst="rect">
+            <a:avLst/>
+          </a:prstGeom>
+          <a:noFill/>
+          <a:ln w="0">
+            <a:noFill/>
+          </a:ln>
+        </p:spPr>
+        <p:txBody>
+          <a:bodyPr lIns="0" rIns="0" tIns="0" bIns="0" anchor="ctr">
+            <a:noAutofit/>
+          </a:bodyPr>
+          <a:p>
+            <a:pPr indent="0" algn="ctr">
+              <a:lnSpc>
+                <a:spcPct val="100000"/>
+              </a:lnSpc>
+              <a:buNone/>
+              <a:tabLst>
+                <a:tab algn="l" pos="0"/>
+              </a:tabLst>
+            </a:pPr>
+            <a:r>
+              <a:rPr b="0" lang="fr-FR" sz="4400" strike="noStrike" u="none">
+                <a:solidFill>
+                  <a:srgbClr val="000000"/>
+                </a:solidFill>
+                <a:uFillTx/>
+                <a:latin typeface="Arial"/>
+              </a:rPr>
+              <a:t>Veille </a:t>
+            </a:r>
+            <a:endParaRPr b="0" lang="fr-FR" sz="4400" strike="noStrike" u="none">
+              <a:solidFill>
+                <a:srgbClr val="000000"/>
+              </a:solidFill>
+              <a:uFillTx/>
+              <a:latin typeface="Arial"/>
+            </a:endParaRPr>
+          </a:p>
+        </p:txBody>
+      </p:sp>
+      <p:sp>
+        <p:nvSpPr>
+          <p:cNvPr id="95" name="PlaceHolder 2"/>
+          <p:cNvSpPr>
+            <a:spLocks noGrp="1"/>
+          </p:cNvSpPr>
+          <p:nvPr>
+            <p:ph/>
+          </p:nvPr>
+        </p:nvSpPr>
+        <p:spPr>
+          <a:xfrm>
+            <a:off x="180000" y="1260000"/>
+            <a:ext cx="8228160" cy="2981880"/>
+          </a:xfrm>
+          <a:prstGeom prst="rect">
+            <a:avLst/>
+          </a:prstGeom>
+          <a:noFill/>
+          <a:ln w="0">
+            <a:noFill/>
+          </a:ln>
+        </p:spPr>
+        <p:txBody>
+          <a:bodyPr lIns="0" rIns="0" tIns="0" bIns="0" anchor="t">
+            <a:normAutofit/>
+          </a:bodyPr>
+          <a:p>
+            <a:pPr indent="0">
+              <a:spcBef>
+                <a:spcPts val="1417"/>
+              </a:spcBef>
+              <a:buNone/>
+            </a:pPr>
+            <a:endParaRPr b="0" lang="fr-FR" sz="1800" strike="noStrike" u="none">
+              <a:solidFill>
+                <a:srgbClr val="000000"/>
+              </a:solidFill>
+              <a:uFillTx/>
+              <a:latin typeface="Arial"/>
+            </a:endParaRPr>
+          </a:p>
+        </p:txBody>
+      </p:sp>
+      <p:pic>
+        <p:nvPicPr>
+          <p:cNvPr id="96" name="" descr=""/>
+          <p:cNvPicPr/>
+          <p:nvPr/>
+        </p:nvPicPr>
+        <p:blipFill>
+          <a:blip r:embed="rId1"/>
+          <a:stretch/>
+        </p:blipFill>
+        <p:spPr>
+          <a:xfrm>
+            <a:off x="0" y="2700000"/>
+            <a:ext cx="4515480" cy="2519280"/>
+          </a:xfrm>
+          <a:prstGeom prst="rect">
+            <a:avLst/>
+          </a:prstGeom>
+          <a:ln w="0">
+            <a:noFill/>
+          </a:ln>
+        </p:spPr>
+      </p:pic>
+      <p:pic>
+        <p:nvPicPr>
+          <p:cNvPr id="97" name="" descr=""/>
+          <p:cNvPicPr/>
+          <p:nvPr/>
+        </p:nvPicPr>
+        <p:blipFill>
+          <a:blip r:embed="rId2"/>
+          <a:stretch/>
+        </p:blipFill>
+        <p:spPr>
+          <a:xfrm>
+            <a:off x="4500000" y="2700000"/>
+            <a:ext cx="4656600" cy="2519280"/>
+          </a:xfrm>
+          <a:prstGeom prst="rect">
+            <a:avLst/>
+          </a:prstGeom>
+          <a:ln w="0">
+            <a:noFill/>
+          </a:ln>
+        </p:spPr>
+      </p:pic>
+    </p:spTree>
+  </p:cSld>
+  <mc:AlternateContent>
+    <mc:Choice Requires="p14">
+      <p:transition spd="slow" p14:dur="2000"/>
+    </mc:Choice>
+    <mc:Fallback>
+      <p:transition spd="slow"/>
+    </mc:Fallback>
+  </mc:AlternateContent>
+</p:sld>
+</file>
+
+<file path=ppt/slides/slide22.xml><?xml version="1.0" encoding="utf-8"?>
+<p:sld xmlns:a="http://schemas.openxmlformats.org/drawingml/2006/main" xmlns:p="http://schemas.openxmlformats.org/presentationml/2006/main" xmlns:r="http://schemas.openxmlformats.org/officeDocument/2006/relationships" xmlns:p14="http://schemas.microsoft.com/office/powerpoint/2010/main" xmlns:p15="http://schemas.microsoft.com/office/powerpoint/2012/main" xmlns:mc="http://schemas.openxmlformats.org/markup-compatibility/2006">
+  <p:cSld>
+    <p:spTree>
+      <p:nvGrpSpPr>
+        <p:cNvPr id="1" name=""/>
+        <p:cNvGrpSpPr/>
+        <p:nvPr/>
+      </p:nvGrpSpPr>
+      <p:grpSpPr>
+        <a:xfrm>
+          <a:off x="0" y="0"/>
+          <a:ext cx="0" cy="0"/>
+          <a:chOff x="0" y="0"/>
+          <a:chExt cx="0" cy="0"/>
+        </a:xfrm>
+      </p:grpSpPr>
+      <p:sp>
+        <p:nvSpPr>
+          <p:cNvPr id="98" name="PlaceHolder 1"/>
+          <p:cNvSpPr>
+            <a:spLocks noGrp="1"/>
+          </p:cNvSpPr>
+          <p:nvPr>
+            <p:ph type="title"/>
+          </p:nvPr>
+        </p:nvSpPr>
+        <p:spPr>
+          <a:xfrm>
+            <a:off x="311760" y="444960"/>
+            <a:ext cx="8519040" cy="571320"/>
+          </a:xfrm>
+          <a:prstGeom prst="rect">
+            <a:avLst/>
+          </a:prstGeom>
+          <a:noFill/>
+          <a:ln w="0">
+            <a:noFill/>
+          </a:ln>
+        </p:spPr>
+        <p:txBody>
+          <a:bodyPr lIns="91440" rIns="91440" tIns="91440" bIns="91440" anchor="t">
+            <a:normAutofit/>
+          </a:bodyPr>
+          <a:p>
+            <a:pPr indent="0">
+              <a:lnSpc>
+                <a:spcPct val="115000"/>
+              </a:lnSpc>
+              <a:spcAft>
+                <a:spcPts val="1199"/>
+              </a:spcAft>
+              <a:buNone/>
+              <a:tabLst>
+                <a:tab algn="l" pos="0"/>
+              </a:tabLst>
+            </a:pPr>
+            <a:r>
+              <a:rPr b="0" lang="fr" sz="2000" strike="noStrike" u="none">
+                <a:solidFill>
+                  <a:schemeClr val="dk1"/>
+                </a:solidFill>
+                <a:uFillTx/>
+                <a:latin typeface="Montserrat"/>
+                <a:ea typeface="Montserrat"/>
+              </a:rPr>
+              <a:t>Conclusion</a:t>
+            </a:r>
+            <a:endParaRPr b="0" lang="fr-FR" sz="2000" strike="noStrike" u="none">
+              <a:solidFill>
+                <a:srgbClr val="000000"/>
+              </a:solidFill>
+              <a:uFillTx/>
+              <a:latin typeface="Arial"/>
+            </a:endParaRPr>
+          </a:p>
+        </p:txBody>
+      </p:sp>
+      <p:sp>
+        <p:nvSpPr>
+          <p:cNvPr id="99" name="PlaceHolder 2"/>
+          <p:cNvSpPr>
+            <a:spLocks noGrp="1"/>
+          </p:cNvSpPr>
+          <p:nvPr>
+            <p:ph/>
+          </p:nvPr>
+        </p:nvSpPr>
+        <p:spPr>
+          <a:xfrm>
+            <a:off x="311760" y="1152360"/>
+            <a:ext cx="8519040" cy="3414960"/>
+          </a:xfrm>
+          <a:prstGeom prst="rect">
+            <a:avLst/>
+          </a:prstGeom>
+          <a:noFill/>
+          <a:ln w="0">
+            <a:noFill/>
+          </a:ln>
+        </p:spPr>
+        <p:txBody>
+          <a:bodyPr lIns="91440" rIns="91440" tIns="91440" bIns="91440" anchor="t">
+            <a:normAutofit/>
+          </a:bodyPr>
+          <a:p>
+            <a:pPr indent="0">
+              <a:lnSpc>
+                <a:spcPct val="115000"/>
+              </a:lnSpc>
+              <a:buNone/>
+              <a:tabLst>
+                <a:tab algn="l" pos="0"/>
+              </a:tabLst>
+            </a:pPr>
+            <a:endParaRPr b="0" lang="fr-FR" sz="1800" strike="noStrike" u="none">
+              <a:solidFill>
+                <a:srgbClr val="000000"/>
+              </a:solidFill>
+              <a:uFillTx/>
+              <a:latin typeface="Arial"/>
+            </a:endParaRPr>
+          </a:p>
+          <a:p>
+            <a:pPr indent="0">
+              <a:lnSpc>
+                <a:spcPct val="115000"/>
+              </a:lnSpc>
+              <a:spcBef>
+                <a:spcPts val="1199"/>
+              </a:spcBef>
+              <a:buNone/>
+              <a:tabLst>
+                <a:tab algn="l" pos="0"/>
+              </a:tabLst>
+            </a:pPr>
+            <a:endParaRPr b="0" lang="fr-FR" sz="1800" strike="noStrike" u="none">
+              <a:solidFill>
+                <a:srgbClr val="000000"/>
+              </a:solidFill>
+              <a:uFillTx/>
+              <a:latin typeface="Arial"/>
+            </a:endParaRPr>
+          </a:p>
+          <a:p>
+            <a:pPr marL="457200" indent="0">
+              <a:lnSpc>
+                <a:spcPct val="115000"/>
+              </a:lnSpc>
+              <a:spcBef>
+                <a:spcPts val="1199"/>
+              </a:spcBef>
+              <a:spcAft>
+                <a:spcPts val="1199"/>
+              </a:spcAft>
+              <a:buNone/>
+              <a:tabLst>
+                <a:tab algn="l" pos="0"/>
+              </a:tabLst>
+            </a:pPr>
+            <a:endParaRPr b="0" lang="fr-FR" sz="1800" strike="noStrike" u="none">
+              <a:solidFill>
+                <a:srgbClr val="000000"/>
+              </a:solidFill>
+              <a:uFillTx/>
+              <a:latin typeface="Arial"/>
+            </a:endParaRPr>
+          </a:p>
+        </p:txBody>
+      </p:sp>
+      <p:sp>
+        <p:nvSpPr>
+          <p:cNvPr id="100" name="Google Shape;123;p21"/>
+          <p:cNvSpPr/>
+          <p:nvPr/>
+        </p:nvSpPr>
+        <p:spPr>
+          <a:xfrm>
+            <a:off x="0" y="0"/>
+            <a:ext cx="4910040" cy="351360"/>
+          </a:xfrm>
+          <a:prstGeom prst="rect">
+            <a:avLst/>
+          </a:prstGeom>
+          <a:noFill/>
+          <a:ln w="0">
+            <a:noFill/>
+          </a:ln>
+        </p:spPr>
+        <p:style>
+          <a:lnRef idx="0"/>
+          <a:fillRef idx="0"/>
+          <a:effectRef idx="0"/>
+          <a:fontRef idx="minor"/>
+        </p:style>
+        <p:txBody>
+          <a:bodyPr lIns="90000" rIns="90000" tIns="88200" bIns="88200" anchor="t">
+            <a:spAutoFit/>
+          </a:bodyPr>
+          <a:p>
+            <a:pPr>
+              <a:lnSpc>
+                <a:spcPct val="115000"/>
+              </a:lnSpc>
+              <a:spcAft>
+                <a:spcPts val="1199"/>
+              </a:spcAft>
+              <a:tabLst>
+                <a:tab algn="l" pos="0"/>
+              </a:tabLst>
+            </a:pPr>
+            <a:r>
+              <a:rPr b="0" lang="fr" sz="1000" strike="noStrike" u="none">
+                <a:solidFill>
+                  <a:schemeClr val="dk2"/>
+                </a:solidFill>
+                <a:uFillTx/>
+                <a:latin typeface="Montserrat"/>
+                <a:ea typeface="Montserrat"/>
+              </a:rPr>
+              <a:t>Présentation de l’usage du no-code</a:t>
+            </a:r>
+            <a:endParaRPr b="0" lang="fr-FR" sz="1000" strike="noStrike" u="none">
+              <a:solidFill>
+                <a:srgbClr val="000000"/>
+              </a:solidFill>
+              <a:uFillTx/>
+              <a:latin typeface="Arial"/>
+            </a:endParaRPr>
+          </a:p>
+        </p:txBody>
+      </p:sp>
+      <p:sp>
+        <p:nvSpPr>
+          <p:cNvPr id="101" name="Google Shape;124;p21"/>
+          <p:cNvSpPr/>
+          <p:nvPr/>
+        </p:nvSpPr>
+        <p:spPr>
+          <a:xfrm>
+            <a:off x="434880" y="1085400"/>
+            <a:ext cx="8319240" cy="869040"/>
+          </a:xfrm>
+          <a:prstGeom prst="rect">
+            <a:avLst/>
+          </a:prstGeom>
+          <a:noFill/>
+          <a:ln w="0">
+            <a:noFill/>
+          </a:ln>
+        </p:spPr>
+        <p:style>
+          <a:lnRef idx="0"/>
+          <a:fillRef idx="0"/>
+          <a:effectRef idx="0"/>
+          <a:fontRef idx="minor"/>
+        </p:style>
+        <p:txBody>
+          <a:bodyPr lIns="90000" rIns="90000" tIns="91440" bIns="91440" anchor="t">
+            <a:spAutoFit/>
+          </a:bodyPr>
+          <a:p>
+            <a:pPr marL="457200" indent="-343080">
+              <a:lnSpc>
+                <a:spcPct val="115000"/>
+              </a:lnSpc>
+              <a:buClr>
+                <a:srgbClr val="0d0d0d"/>
+              </a:buClr>
+              <a:buFont typeface="Montserrat"/>
+              <a:buChar char="●"/>
+            </a:pPr>
+            <a:r>
+              <a:rPr b="0" lang="fr" sz="1500" strike="noStrike" u="none">
+                <a:solidFill>
+                  <a:srgbClr val="0d0d0d"/>
+                </a:solidFill>
+                <a:highlight>
+                  <a:srgbClr val="ffffff"/>
+                </a:highlight>
+                <a:uFillTx/>
+                <a:latin typeface="Montserrat"/>
+                <a:ea typeface="Montserrat"/>
+              </a:rPr>
+              <a:t>Résumé des points clés de la présentation</a:t>
+            </a:r>
+            <a:endParaRPr b="0" lang="fr-FR" sz="1500" strike="noStrike" u="none">
+              <a:solidFill>
+                <a:srgbClr val="000000"/>
+              </a:solidFill>
+              <a:uFillTx/>
+              <a:latin typeface="Arial"/>
+            </a:endParaRPr>
+          </a:p>
+          <a:p>
+            <a:pPr>
+              <a:lnSpc>
+                <a:spcPct val="115000"/>
+              </a:lnSpc>
+              <a:tabLst>
+                <a:tab algn="l" pos="0"/>
+              </a:tabLst>
+            </a:pPr>
+            <a:endParaRPr b="0" lang="fr-FR" sz="1200" strike="noStrike" u="none">
+              <a:solidFill>
+                <a:srgbClr val="000000"/>
+              </a:solidFill>
+              <a:uFillTx/>
+              <a:latin typeface="Arial"/>
+            </a:endParaRPr>
+          </a:p>
+          <a:p>
+            <a:pPr>
+              <a:lnSpc>
+                <a:spcPct val="100000"/>
+              </a:lnSpc>
+              <a:spcBef>
+                <a:spcPts val="1199"/>
+              </a:spcBef>
+              <a:tabLst>
+                <a:tab algn="l" pos="0"/>
+              </a:tabLst>
+            </a:pPr>
+            <a:endParaRPr b="0" lang="fr-FR" sz="1400" strike="noStrike" u="none">
+              <a:solidFill>
+                <a:srgbClr val="000000"/>
+              </a:solidFill>
+              <a:uFillTx/>
+              <a:latin typeface="Arial"/>
+            </a:endParaRPr>
+          </a:p>
+        </p:txBody>
+      </p:sp>
+      <p:sp>
+        <p:nvSpPr>
+          <p:cNvPr id="102" name="Google Shape;125;p21"/>
+          <p:cNvSpPr/>
+          <p:nvPr/>
+        </p:nvSpPr>
+        <p:spPr>
+          <a:xfrm>
+            <a:off x="-4680" y="0"/>
+            <a:ext cx="9152280" cy="238320"/>
+          </a:xfrm>
+          <a:prstGeom prst="rect">
+            <a:avLst/>
+          </a:prstGeom>
+          <a:solidFill>
+            <a:srgbClr val="fce5cd"/>
+          </a:solidFill>
+          <a:ln w="9525">
+            <a:solidFill>
+              <a:srgbClr val="f7edde"/>
+            </a:solidFill>
+            <a:round/>
+          </a:ln>
+        </p:spPr>
+        <p:style>
+          <a:lnRef idx="0"/>
+          <a:fillRef idx="0"/>
+          <a:effectRef idx="0"/>
+          <a:fontRef idx="minor"/>
+        </p:style>
+        <p:txBody>
+          <a:bodyPr lIns="90000" rIns="90000" tIns="91440" bIns="91440" anchor="ctr">
+            <a:noAutofit/>
+          </a:bodyPr>
+          <a:p>
+            <a:pPr algn="ctr">
+              <a:lnSpc>
+                <a:spcPct val="100000"/>
+              </a:lnSpc>
+              <a:tabLst>
+                <a:tab algn="l" pos="0"/>
+              </a:tabLst>
+            </a:pPr>
+            <a:endParaRPr b="0" lang="fr-FR" sz="1400" strike="noStrike" u="none">
+              <a:solidFill>
+                <a:srgbClr val="000000"/>
+              </a:solidFill>
+              <a:uFillTx/>
+              <a:latin typeface="Arial"/>
+            </a:endParaRPr>
+          </a:p>
+        </p:txBody>
+      </p:sp>
+      <p:pic>
+        <p:nvPicPr>
+          <p:cNvPr id="103" name="Google Shape;126;p21" descr=""/>
+          <p:cNvPicPr/>
+          <p:nvPr/>
+        </p:nvPicPr>
+        <p:blipFill>
+          <a:blip r:embed="rId1"/>
+          <a:stretch/>
+        </p:blipFill>
+        <p:spPr>
+          <a:xfrm>
+            <a:off x="8469720" y="0"/>
+            <a:ext cx="672840" cy="339120"/>
+          </a:xfrm>
+          <a:prstGeom prst="rect">
+            <a:avLst/>
+          </a:prstGeom>
+          <a:ln w="0">
+            <a:noFill/>
+          </a:ln>
+        </p:spPr>
+      </p:pic>
+    </p:spTree>
+  </p:cSld>
+  <mc:AlternateContent>
+    <mc:Choice Requires="p14">
+      <p:transition spd="slow" p14:dur="2000"/>
+    </mc:Choice>
+    <mc:Fallback>
+      <p:transition spd="slow"/>
+    </mc:Fallback>
+  </mc:AlternateContent>
+</p:sld>
+</file>
+
+<file path=ppt/slides/slide23.xml><?xml version="1.0" encoding="utf-8"?>
+<p:sld xmlns:a="http://schemas.openxmlformats.org/drawingml/2006/main" xmlns:p="http://schemas.openxmlformats.org/presentationml/2006/main" xmlns:r="http://schemas.openxmlformats.org/officeDocument/2006/relationships" xmlns:p14="http://schemas.microsoft.com/office/powerpoint/2010/main" xmlns:p15="http://schemas.microsoft.com/office/powerpoint/2012/main" xmlns:mc="http://schemas.openxmlformats.org/markup-compatibility/2006">
+  <p:cSld>
     <p:bg>
       <p:bgPr>
         <a:solidFill>
@@ -7019,14 +7127,14 @@
       </p:grpSpPr>
       <p:sp>
         <p:nvSpPr>
-          <p:cNvPr id="102" name="Google Shape;131;p22"/>
+          <p:cNvPr id="104" name="Google Shape;131;p22"/>
           <p:cNvSpPr/>
           <p:nvPr/>
         </p:nvSpPr>
         <p:spPr>
           <a:xfrm>
             <a:off x="2411640" y="2125800"/>
-            <a:ext cx="4221000" cy="801000"/>
+            <a:ext cx="4220640" cy="800640"/>
           </a:xfrm>
           <a:prstGeom prst="rect">
             <a:avLst/>
@@ -7078,14 +7186,14 @@
       </p:sp>
       <p:sp>
         <p:nvSpPr>
-          <p:cNvPr id="103" name="Google Shape;132;p22"/>
+          <p:cNvPr id="105" name="Google Shape;132;p22"/>
           <p:cNvSpPr/>
           <p:nvPr/>
         </p:nvSpPr>
         <p:spPr>
           <a:xfrm>
             <a:off x="115200" y="118440"/>
-            <a:ext cx="2383560" cy="279000"/>
+            <a:ext cx="2383200" cy="278640"/>
           </a:xfrm>
           <a:prstGeom prst="rect">
             <a:avLst/>
@@ -7126,7 +7234,7 @@
       </p:sp>
       <p:pic>
         <p:nvPicPr>
-          <p:cNvPr id="104" name="Google Shape;133;p22" descr=""/>
+          <p:cNvPr id="106" name="Google Shape;133;p22" descr=""/>
           <p:cNvPicPr/>
           <p:nvPr/>
         </p:nvPicPr>
@@ -7137,7 +7245,7 @@
         <p:spPr>
           <a:xfrm>
             <a:off x="8469720" y="0"/>
-            <a:ext cx="673200" cy="339480"/>
+            <a:ext cx="672840" cy="339120"/>
           </a:xfrm>
           <a:prstGeom prst="rect">
             <a:avLst/>
@@ -7190,7 +7298,7 @@
         <p:spPr>
           <a:xfrm>
             <a:off x="311760" y="444960"/>
-            <a:ext cx="8519400" cy="571680"/>
+            <a:ext cx="8519040" cy="571320"/>
           </a:xfrm>
           <a:prstGeom prst="rect">
             <a:avLst/>
@@ -7247,7 +7355,7 @@
         <p:spPr>
           <a:xfrm>
             <a:off x="434880" y="1085400"/>
-            <a:ext cx="8319600" cy="1310400"/>
+            <a:ext cx="8319240" cy="1310400"/>
           </a:xfrm>
           <a:prstGeom prst="rect">
             <a:avLst/>
@@ -7334,7 +7442,7 @@
         <p:spPr>
           <a:xfrm>
             <a:off x="-4680" y="0"/>
-            <a:ext cx="9152640" cy="238680"/>
+            <a:ext cx="9152280" cy="238320"/>
           </a:xfrm>
           <a:prstGeom prst="rect">
             <a:avLst/>
@@ -7391,7 +7499,7 @@
         <p:spPr>
           <a:xfrm>
             <a:off x="8474400" y="0"/>
-            <a:ext cx="673200" cy="339480"/>
+            <a:ext cx="672840" cy="339120"/>
           </a:xfrm>
           <a:prstGeom prst="rect">
             <a:avLst/>
@@ -7444,7 +7552,7 @@
         <p:spPr>
           <a:xfrm>
             <a:off x="311760" y="356040"/>
-            <a:ext cx="8519400" cy="749520"/>
+            <a:ext cx="8519040" cy="749160"/>
           </a:xfrm>
           <a:prstGeom prst="rect">
             <a:avLst/>
@@ -7505,7 +7613,7 @@
         <p:spPr>
           <a:xfrm>
             <a:off x="4079880" y="183960"/>
-            <a:ext cx="8519400" cy="3415320"/>
+            <a:ext cx="8519040" cy="3414960"/>
           </a:xfrm>
           <a:prstGeom prst="rect">
             <a:avLst/>
@@ -7586,7 +7694,7 @@
         <p:spPr>
           <a:xfrm>
             <a:off x="3966480" y="643680"/>
-            <a:ext cx="3052800" cy="4499280"/>
+            <a:ext cx="3052440" cy="4498920"/>
           </a:xfrm>
           <a:prstGeom prst="rect">
             <a:avLst/>
@@ -7639,7 +7747,7 @@
         <p:spPr>
           <a:xfrm>
             <a:off x="311760" y="356040"/>
-            <a:ext cx="8519400" cy="749520"/>
+            <a:ext cx="8519040" cy="749160"/>
           </a:xfrm>
           <a:prstGeom prst="rect">
             <a:avLst/>
@@ -7700,7 +7808,7 @@
         <p:spPr>
           <a:xfrm>
             <a:off x="311760" y="1152360"/>
-            <a:ext cx="8519400" cy="3415320"/>
+            <a:ext cx="8519040" cy="3414960"/>
           </a:xfrm>
           <a:prstGeom prst="rect">
             <a:avLst/>
@@ -7841,7 +7949,7 @@
         <p:spPr>
           <a:xfrm>
             <a:off x="0" y="1696320"/>
-            <a:ext cx="4442400" cy="3162960"/>
+            <a:ext cx="4442040" cy="3162600"/>
           </a:xfrm>
           <a:prstGeom prst="rect">
             <a:avLst/>
@@ -7864,7 +7972,7 @@
         <p:spPr>
           <a:xfrm>
             <a:off x="4500000" y="1696320"/>
-            <a:ext cx="4582440" cy="2802960"/>
+            <a:ext cx="4582080" cy="2802600"/>
           </a:xfrm>
           <a:prstGeom prst="rect">
             <a:avLst/>
@@ -7917,7 +8025,7 @@
         <p:spPr>
           <a:xfrm>
             <a:off x="311760" y="356040"/>
-            <a:ext cx="8519400" cy="749520"/>
+            <a:ext cx="8519040" cy="749160"/>
           </a:xfrm>
           <a:prstGeom prst="rect">
             <a:avLst/>
@@ -7978,7 +8086,7 @@
         <p:spPr>
           <a:xfrm>
             <a:off x="311760" y="1152360"/>
-            <a:ext cx="8519400" cy="3415320"/>
+            <a:ext cx="8519040" cy="3414960"/>
           </a:xfrm>
           <a:prstGeom prst="rect">
             <a:avLst/>
@@ -8096,7 +8204,7 @@
         <p:spPr>
           <a:xfrm>
             <a:off x="180000" y="1800000"/>
-            <a:ext cx="4319280" cy="3066840"/>
+            <a:ext cx="4318920" cy="3066480"/>
           </a:xfrm>
           <a:prstGeom prst="rect">
             <a:avLst/>
@@ -8119,7 +8227,7 @@
         <p:spPr>
           <a:xfrm>
             <a:off x="4680000" y="1794960"/>
-            <a:ext cx="4307760" cy="3064320"/>
+            <a:ext cx="4307400" cy="3063960"/>
           </a:xfrm>
           <a:prstGeom prst="rect">
             <a:avLst/>
@@ -8172,7 +8280,7 @@
         <p:spPr>
           <a:xfrm>
             <a:off x="311760" y="356040"/>
-            <a:ext cx="8519400" cy="749520"/>
+            <a:ext cx="8519040" cy="749160"/>
           </a:xfrm>
           <a:prstGeom prst="rect">
             <a:avLst/>
@@ -8233,7 +8341,7 @@
         <p:spPr>
           <a:xfrm>
             <a:off x="3179880" y="900000"/>
-            <a:ext cx="8519400" cy="3415320"/>
+            <a:ext cx="8519040" cy="3414960"/>
           </a:xfrm>
           <a:prstGeom prst="rect">
             <a:avLst/>
@@ -8293,7 +8401,7 @@
         <p:spPr>
           <a:xfrm>
             <a:off x="1080000" y="1175400"/>
-            <a:ext cx="7379280" cy="3967560"/>
+            <a:ext cx="7378920" cy="3967200"/>
           </a:xfrm>
           <a:prstGeom prst="rect">
             <a:avLst/>
@@ -8346,7 +8454,7 @@
         <p:spPr>
           <a:xfrm>
             <a:off x="311760" y="356040"/>
-            <a:ext cx="8519400" cy="749520"/>
+            <a:ext cx="8519040" cy="749160"/>
           </a:xfrm>
           <a:prstGeom prst="rect">
             <a:avLst/>
@@ -8407,7 +8515,7 @@
         <p:spPr>
           <a:xfrm>
             <a:off x="311760" y="1152360"/>
-            <a:ext cx="8519400" cy="3415320"/>
+            <a:ext cx="8519040" cy="3414960"/>
           </a:xfrm>
           <a:prstGeom prst="rect">
             <a:avLst/>
@@ -8507,7 +8615,7 @@
         <p:spPr>
           <a:xfrm>
             <a:off x="2340000" y="1443240"/>
-            <a:ext cx="5219280" cy="3699720"/>
+            <a:ext cx="5218920" cy="3699360"/>
           </a:xfrm>
           <a:prstGeom prst="rect">
             <a:avLst/>
@@ -8560,7 +8668,7 @@
         <p:spPr>
           <a:xfrm>
             <a:off x="311760" y="356040"/>
-            <a:ext cx="8519400" cy="749520"/>
+            <a:ext cx="8519040" cy="749160"/>
           </a:xfrm>
           <a:prstGeom prst="rect">
             <a:avLst/>
@@ -8621,7 +8729,7 @@
         <p:spPr>
           <a:xfrm>
             <a:off x="299880" y="1263960"/>
-            <a:ext cx="8519400" cy="3415320"/>
+            <a:ext cx="8519040" cy="3414960"/>
           </a:xfrm>
           <a:prstGeom prst="rect">
             <a:avLst/>
@@ -8681,7 +8789,7 @@
         <p:spPr>
           <a:xfrm>
             <a:off x="0" y="1980000"/>
-            <a:ext cx="4427280" cy="3162960"/>
+            <a:ext cx="4426920" cy="3162600"/>
           </a:xfrm>
           <a:prstGeom prst="rect">
             <a:avLst/>
@@ -8704,7 +8812,7 @@
         <p:spPr>
           <a:xfrm>
             <a:off x="4677480" y="1980000"/>
-            <a:ext cx="4465800" cy="3162960"/>
+            <a:ext cx="4465440" cy="3162600"/>
           </a:xfrm>
           <a:prstGeom prst="rect">
             <a:avLst/>

</xml_diff>